<commit_message>
renamed program to BioRAF
</commit_message>
<xml_diff>
--- a/artwork/splash.pptx
+++ b/artwork/splash.pptx
@@ -4,9 +4,14 @@
   <p:sldMasterIdLst>
     <p:sldMasterId id="2147483648" r:id="rId1"/>
   </p:sldMasterIdLst>
+  <p:notesMasterIdLst>
+    <p:notesMasterId r:id="rId6"/>
+  </p:notesMasterIdLst>
   <p:sldIdLst>
     <p:sldId id="256" r:id="rId2"/>
     <p:sldId id="257" r:id="rId3"/>
+    <p:sldId id="258" r:id="rId4"/>
+    <p:sldId id="259" r:id="rId5"/>
   </p:sldIdLst>
   <p:sldSz cx="9144000" cy="6858000" type="screen4x3"/>
   <p:notesSz cx="6858000" cy="9144000"/>
@@ -124,6 +129,355 @@
 </p:presentation>
 </file>
 
+<file path=ppt/notesMasters/notesMaster1.xml><?xml version="1.0" encoding="utf-8"?>
+<p:notesMaster xmlns:a="http://schemas.openxmlformats.org/drawingml/2006/main" xmlns:r="http://schemas.openxmlformats.org/officeDocument/2006/relationships" xmlns:p="http://schemas.openxmlformats.org/presentationml/2006/main">
+  <p:cSld>
+    <p:bg>
+      <p:bgRef idx="1001">
+        <a:schemeClr val="bg1"/>
+      </p:bgRef>
+    </p:bg>
+    <p:spTree>
+      <p:nvGrpSpPr>
+        <p:cNvPr id="1" name=""/>
+        <p:cNvGrpSpPr/>
+        <p:nvPr/>
+      </p:nvGrpSpPr>
+      <p:grpSpPr>
+        <a:xfrm>
+          <a:off x="0" y="0"/>
+          <a:ext cx="0" cy="0"/>
+          <a:chOff x="0" y="0"/>
+          <a:chExt cx="0" cy="0"/>
+        </a:xfrm>
+      </p:grpSpPr>
+      <p:sp>
+        <p:nvSpPr>
+          <p:cNvPr id="2" name="Header Placeholder 1"/>
+          <p:cNvSpPr>
+            <a:spLocks noGrp="1"/>
+          </p:cNvSpPr>
+          <p:nvPr>
+            <p:ph type="hdr" sz="quarter"/>
+          </p:nvPr>
+        </p:nvSpPr>
+        <p:spPr>
+          <a:xfrm>
+            <a:off x="0" y="0"/>
+            <a:ext cx="2971800" cy="458788"/>
+          </a:xfrm>
+          <a:prstGeom prst="rect">
+            <a:avLst/>
+          </a:prstGeom>
+        </p:spPr>
+        <p:txBody>
+          <a:bodyPr vert="horz" lIns="91440" tIns="45720" rIns="91440" bIns="45720" rtlCol="0"/>
+          <a:lstStyle>
+            <a:lvl1pPr algn="l">
+              <a:defRPr sz="1200"/>
+            </a:lvl1pPr>
+          </a:lstStyle>
+          <a:p>
+            <a:endParaRPr lang="en-US"/>
+          </a:p>
+        </p:txBody>
+      </p:sp>
+      <p:sp>
+        <p:nvSpPr>
+          <p:cNvPr id="3" name="Date Placeholder 2"/>
+          <p:cNvSpPr>
+            <a:spLocks noGrp="1"/>
+          </p:cNvSpPr>
+          <p:nvPr>
+            <p:ph type="dt" idx="1"/>
+          </p:nvPr>
+        </p:nvSpPr>
+        <p:spPr>
+          <a:xfrm>
+            <a:off x="3884613" y="0"/>
+            <a:ext cx="2971800" cy="458788"/>
+          </a:xfrm>
+          <a:prstGeom prst="rect">
+            <a:avLst/>
+          </a:prstGeom>
+        </p:spPr>
+        <p:txBody>
+          <a:bodyPr vert="horz" lIns="91440" tIns="45720" rIns="91440" bIns="45720" rtlCol="0"/>
+          <a:lstStyle>
+            <a:lvl1pPr algn="r">
+              <a:defRPr sz="1200"/>
+            </a:lvl1pPr>
+          </a:lstStyle>
+          <a:p>
+            <a:fld id="{2FAA8BB9-787D-C748-BF33-AE006B190EF4}" type="datetimeFigureOut">
+              <a:rPr lang="en-US" smtClean="0"/>
+              <a:t>3/3/24</a:t>
+            </a:fld>
+            <a:endParaRPr lang="en-US"/>
+          </a:p>
+        </p:txBody>
+      </p:sp>
+      <p:sp>
+        <p:nvSpPr>
+          <p:cNvPr id="4" name="Slide Image Placeholder 3"/>
+          <p:cNvSpPr>
+            <a:spLocks noGrp="1" noRot="1" noChangeAspect="1"/>
+          </p:cNvSpPr>
+          <p:nvPr>
+            <p:ph type="sldImg" idx="2"/>
+          </p:nvPr>
+        </p:nvSpPr>
+        <p:spPr>
+          <a:xfrm>
+            <a:off x="1371600" y="1143000"/>
+            <a:ext cx="4114800" cy="3086100"/>
+          </a:xfrm>
+          <a:prstGeom prst="rect">
+            <a:avLst/>
+          </a:prstGeom>
+          <a:noFill/>
+          <a:ln w="12700">
+            <a:solidFill>
+              <a:prstClr val="black"/>
+            </a:solidFill>
+          </a:ln>
+        </p:spPr>
+        <p:txBody>
+          <a:bodyPr vert="horz" lIns="91440" tIns="45720" rIns="91440" bIns="45720" rtlCol="0" anchor="ctr"/>
+          <a:lstStyle/>
+          <a:p>
+            <a:endParaRPr lang="en-US"/>
+          </a:p>
+        </p:txBody>
+      </p:sp>
+      <p:sp>
+        <p:nvSpPr>
+          <p:cNvPr id="5" name="Notes Placeholder 4"/>
+          <p:cNvSpPr>
+            <a:spLocks noGrp="1"/>
+          </p:cNvSpPr>
+          <p:nvPr>
+            <p:ph type="body" sz="quarter" idx="3"/>
+          </p:nvPr>
+        </p:nvSpPr>
+        <p:spPr>
+          <a:xfrm>
+            <a:off x="685800" y="4400550"/>
+            <a:ext cx="5486400" cy="3600450"/>
+          </a:xfrm>
+          <a:prstGeom prst="rect">
+            <a:avLst/>
+          </a:prstGeom>
+        </p:spPr>
+        <p:txBody>
+          <a:bodyPr vert="horz" lIns="91440" tIns="45720" rIns="91440" bIns="45720" rtlCol="0"/>
+          <a:lstStyle/>
+          <a:p>
+            <a:pPr lvl="0"/>
+            <a:r>
+              <a:rPr lang="en-US"/>
+              <a:t>Click to edit Master text styles</a:t>
+            </a:r>
+          </a:p>
+          <a:p>
+            <a:pPr lvl="1"/>
+            <a:r>
+              <a:rPr lang="en-US"/>
+              <a:t>Second level</a:t>
+            </a:r>
+          </a:p>
+          <a:p>
+            <a:pPr lvl="2"/>
+            <a:r>
+              <a:rPr lang="en-US"/>
+              <a:t>Third level</a:t>
+            </a:r>
+          </a:p>
+          <a:p>
+            <a:pPr lvl="3"/>
+            <a:r>
+              <a:rPr lang="en-US"/>
+              <a:t>Fourth level</a:t>
+            </a:r>
+          </a:p>
+          <a:p>
+            <a:pPr lvl="4"/>
+            <a:r>
+              <a:rPr lang="en-US"/>
+              <a:t>Fifth level</a:t>
+            </a:r>
+          </a:p>
+        </p:txBody>
+      </p:sp>
+      <p:sp>
+        <p:nvSpPr>
+          <p:cNvPr id="6" name="Footer Placeholder 5"/>
+          <p:cNvSpPr>
+            <a:spLocks noGrp="1"/>
+          </p:cNvSpPr>
+          <p:nvPr>
+            <p:ph type="ftr" sz="quarter" idx="4"/>
+          </p:nvPr>
+        </p:nvSpPr>
+        <p:spPr>
+          <a:xfrm>
+            <a:off x="0" y="8685213"/>
+            <a:ext cx="2971800" cy="458787"/>
+          </a:xfrm>
+          <a:prstGeom prst="rect">
+            <a:avLst/>
+          </a:prstGeom>
+        </p:spPr>
+        <p:txBody>
+          <a:bodyPr vert="horz" lIns="91440" tIns="45720" rIns="91440" bIns="45720" rtlCol="0" anchor="b"/>
+          <a:lstStyle>
+            <a:lvl1pPr algn="l">
+              <a:defRPr sz="1200"/>
+            </a:lvl1pPr>
+          </a:lstStyle>
+          <a:p>
+            <a:endParaRPr lang="en-US"/>
+          </a:p>
+        </p:txBody>
+      </p:sp>
+      <p:sp>
+        <p:nvSpPr>
+          <p:cNvPr id="7" name="Slide Number Placeholder 6"/>
+          <p:cNvSpPr>
+            <a:spLocks noGrp="1"/>
+          </p:cNvSpPr>
+          <p:nvPr>
+            <p:ph type="sldNum" sz="quarter" idx="5"/>
+          </p:nvPr>
+        </p:nvSpPr>
+        <p:spPr>
+          <a:xfrm>
+            <a:off x="3884613" y="8685213"/>
+            <a:ext cx="2971800" cy="458787"/>
+          </a:xfrm>
+          <a:prstGeom prst="rect">
+            <a:avLst/>
+          </a:prstGeom>
+        </p:spPr>
+        <p:txBody>
+          <a:bodyPr vert="horz" lIns="91440" tIns="45720" rIns="91440" bIns="45720" rtlCol="0" anchor="b"/>
+          <a:lstStyle>
+            <a:lvl1pPr algn="r">
+              <a:defRPr sz="1200"/>
+            </a:lvl1pPr>
+          </a:lstStyle>
+          <a:p>
+            <a:fld id="{4E9E7EEF-5402-DF48-BC94-505A75D34A9E}" type="slidenum">
+              <a:rPr lang="en-US" smtClean="0"/>
+              <a:t>‹#›</a:t>
+            </a:fld>
+            <a:endParaRPr lang="en-US"/>
+          </a:p>
+        </p:txBody>
+      </p:sp>
+    </p:spTree>
+    <p:extLst>
+      <p:ext uri="{BB962C8B-B14F-4D97-AF65-F5344CB8AC3E}">
+        <p14:creationId xmlns:p14="http://schemas.microsoft.com/office/powerpoint/2010/main" val="1623420340"/>
+      </p:ext>
+    </p:extLst>
+  </p:cSld>
+  <p:clrMap bg1="lt1" tx1="dk1" bg2="lt2" tx2="dk2" accent1="accent1" accent2="accent2" accent3="accent3" accent4="accent4" accent5="accent5" accent6="accent6" hlink="hlink" folHlink="folHlink"/>
+  <p:notesStyle>
+    <a:lvl1pPr marL="0" algn="l" defTabSz="914400" rtl="0" eaLnBrk="1" latinLnBrk="0" hangingPunct="1">
+      <a:defRPr sz="1200" kern="1200">
+        <a:solidFill>
+          <a:schemeClr val="tx1"/>
+        </a:solidFill>
+        <a:latin typeface="+mn-lt"/>
+        <a:ea typeface="+mn-ea"/>
+        <a:cs typeface="+mn-cs"/>
+      </a:defRPr>
+    </a:lvl1pPr>
+    <a:lvl2pPr marL="457200" algn="l" defTabSz="914400" rtl="0" eaLnBrk="1" latinLnBrk="0" hangingPunct="1">
+      <a:defRPr sz="1200" kern="1200">
+        <a:solidFill>
+          <a:schemeClr val="tx1"/>
+        </a:solidFill>
+        <a:latin typeface="+mn-lt"/>
+        <a:ea typeface="+mn-ea"/>
+        <a:cs typeface="+mn-cs"/>
+      </a:defRPr>
+    </a:lvl2pPr>
+    <a:lvl3pPr marL="914400" algn="l" defTabSz="914400" rtl="0" eaLnBrk="1" latinLnBrk="0" hangingPunct="1">
+      <a:defRPr sz="1200" kern="1200">
+        <a:solidFill>
+          <a:schemeClr val="tx1"/>
+        </a:solidFill>
+        <a:latin typeface="+mn-lt"/>
+        <a:ea typeface="+mn-ea"/>
+        <a:cs typeface="+mn-cs"/>
+      </a:defRPr>
+    </a:lvl3pPr>
+    <a:lvl4pPr marL="1371600" algn="l" defTabSz="914400" rtl="0" eaLnBrk="1" latinLnBrk="0" hangingPunct="1">
+      <a:defRPr sz="1200" kern="1200">
+        <a:solidFill>
+          <a:schemeClr val="tx1"/>
+        </a:solidFill>
+        <a:latin typeface="+mn-lt"/>
+        <a:ea typeface="+mn-ea"/>
+        <a:cs typeface="+mn-cs"/>
+      </a:defRPr>
+    </a:lvl4pPr>
+    <a:lvl5pPr marL="1828800" algn="l" defTabSz="914400" rtl="0" eaLnBrk="1" latinLnBrk="0" hangingPunct="1">
+      <a:defRPr sz="1200" kern="1200">
+        <a:solidFill>
+          <a:schemeClr val="tx1"/>
+        </a:solidFill>
+        <a:latin typeface="+mn-lt"/>
+        <a:ea typeface="+mn-ea"/>
+        <a:cs typeface="+mn-cs"/>
+      </a:defRPr>
+    </a:lvl5pPr>
+    <a:lvl6pPr marL="2286000" algn="l" defTabSz="914400" rtl="0" eaLnBrk="1" latinLnBrk="0" hangingPunct="1">
+      <a:defRPr sz="1200" kern="1200">
+        <a:solidFill>
+          <a:schemeClr val="tx1"/>
+        </a:solidFill>
+        <a:latin typeface="+mn-lt"/>
+        <a:ea typeface="+mn-ea"/>
+        <a:cs typeface="+mn-cs"/>
+      </a:defRPr>
+    </a:lvl6pPr>
+    <a:lvl7pPr marL="2743200" algn="l" defTabSz="914400" rtl="0" eaLnBrk="1" latinLnBrk="0" hangingPunct="1">
+      <a:defRPr sz="1200" kern="1200">
+        <a:solidFill>
+          <a:schemeClr val="tx1"/>
+        </a:solidFill>
+        <a:latin typeface="+mn-lt"/>
+        <a:ea typeface="+mn-ea"/>
+        <a:cs typeface="+mn-cs"/>
+      </a:defRPr>
+    </a:lvl7pPr>
+    <a:lvl8pPr marL="3200400" algn="l" defTabSz="914400" rtl="0" eaLnBrk="1" latinLnBrk="0" hangingPunct="1">
+      <a:defRPr sz="1200" kern="1200">
+        <a:solidFill>
+          <a:schemeClr val="tx1"/>
+        </a:solidFill>
+        <a:latin typeface="+mn-lt"/>
+        <a:ea typeface="+mn-ea"/>
+        <a:cs typeface="+mn-cs"/>
+      </a:defRPr>
+    </a:lvl8pPr>
+    <a:lvl9pPr marL="3657600" algn="l" defTabSz="914400" rtl="0" eaLnBrk="1" latinLnBrk="0" hangingPunct="1">
+      <a:defRPr sz="1200" kern="1200">
+        <a:solidFill>
+          <a:schemeClr val="tx1"/>
+        </a:solidFill>
+        <a:latin typeface="+mn-lt"/>
+        <a:ea typeface="+mn-ea"/>
+        <a:cs typeface="+mn-cs"/>
+      </a:defRPr>
+    </a:lvl9pPr>
+  </p:notesStyle>
+</p:notesMaster>
+</file>
+
 <file path=ppt/slideLayouts/slideLayout1.xml><?xml version="1.0" encoding="utf-8"?>
 <p:sldLayout xmlns:a="http://schemas.openxmlformats.org/drawingml/2006/main" xmlns:r="http://schemas.openxmlformats.org/officeDocument/2006/relationships" xmlns:p="http://schemas.openxmlformats.org/presentationml/2006/main" type="title" preserve="1">
   <p:cSld name="Title Slide">
@@ -303,7 +657,7 @@
           <a:p>
             <a:fld id="{88742C7B-830F-6341-9EBD-E5CBEBE7F2B7}" type="datetimeFigureOut">
               <a:rPr lang="en-US" smtClean="0"/>
-              <a:t>7/11/23</a:t>
+              <a:t>3/3/24</a:t>
             </a:fld>
             <a:endParaRPr lang="en-US"/>
           </a:p>
@@ -471,7 +825,7 @@
           <a:p>
             <a:fld id="{88742C7B-830F-6341-9EBD-E5CBEBE7F2B7}" type="datetimeFigureOut">
               <a:rPr lang="en-US" smtClean="0"/>
-              <a:t>7/11/23</a:t>
+              <a:t>3/3/24</a:t>
             </a:fld>
             <a:endParaRPr lang="en-US"/>
           </a:p>
@@ -649,7 +1003,7 @@
           <a:p>
             <a:fld id="{88742C7B-830F-6341-9EBD-E5CBEBE7F2B7}" type="datetimeFigureOut">
               <a:rPr lang="en-US" smtClean="0"/>
-              <a:t>7/11/23</a:t>
+              <a:t>3/3/24</a:t>
             </a:fld>
             <a:endParaRPr lang="en-US"/>
           </a:p>
@@ -817,7 +1171,7 @@
           <a:p>
             <a:fld id="{88742C7B-830F-6341-9EBD-E5CBEBE7F2B7}" type="datetimeFigureOut">
               <a:rPr lang="en-US" smtClean="0"/>
-              <a:t>7/11/23</a:t>
+              <a:t>3/3/24</a:t>
             </a:fld>
             <a:endParaRPr lang="en-US"/>
           </a:p>
@@ -1062,7 +1416,7 @@
           <a:p>
             <a:fld id="{88742C7B-830F-6341-9EBD-E5CBEBE7F2B7}" type="datetimeFigureOut">
               <a:rPr lang="en-US" smtClean="0"/>
-              <a:t>7/11/23</a:t>
+              <a:t>3/3/24</a:t>
             </a:fld>
             <a:endParaRPr lang="en-US"/>
           </a:p>
@@ -1347,7 +1701,7 @@
           <a:p>
             <a:fld id="{88742C7B-830F-6341-9EBD-E5CBEBE7F2B7}" type="datetimeFigureOut">
               <a:rPr lang="en-US" smtClean="0"/>
-              <a:t>7/11/23</a:t>
+              <a:t>3/3/24</a:t>
             </a:fld>
             <a:endParaRPr lang="en-US"/>
           </a:p>
@@ -1766,7 +2120,7 @@
           <a:p>
             <a:fld id="{88742C7B-830F-6341-9EBD-E5CBEBE7F2B7}" type="datetimeFigureOut">
               <a:rPr lang="en-US" smtClean="0"/>
-              <a:t>7/11/23</a:t>
+              <a:t>3/3/24</a:t>
             </a:fld>
             <a:endParaRPr lang="en-US"/>
           </a:p>
@@ -1883,7 +2237,7 @@
           <a:p>
             <a:fld id="{88742C7B-830F-6341-9EBD-E5CBEBE7F2B7}" type="datetimeFigureOut">
               <a:rPr lang="en-US" smtClean="0"/>
-              <a:t>7/11/23</a:t>
+              <a:t>3/3/24</a:t>
             </a:fld>
             <a:endParaRPr lang="en-US"/>
           </a:p>
@@ -1978,7 +2332,7 @@
           <a:p>
             <a:fld id="{88742C7B-830F-6341-9EBD-E5CBEBE7F2B7}" type="datetimeFigureOut">
               <a:rPr lang="en-US" smtClean="0"/>
-              <a:t>7/11/23</a:t>
+              <a:t>3/3/24</a:t>
             </a:fld>
             <a:endParaRPr lang="en-US"/>
           </a:p>
@@ -2253,7 +2607,7 @@
           <a:p>
             <a:fld id="{88742C7B-830F-6341-9EBD-E5CBEBE7F2B7}" type="datetimeFigureOut">
               <a:rPr lang="en-US" smtClean="0"/>
-              <a:t>7/11/23</a:t>
+              <a:t>3/3/24</a:t>
             </a:fld>
             <a:endParaRPr lang="en-US"/>
           </a:p>
@@ -2505,7 +2859,7 @@
           <a:p>
             <a:fld id="{88742C7B-830F-6341-9EBD-E5CBEBE7F2B7}" type="datetimeFigureOut">
               <a:rPr lang="en-US" smtClean="0"/>
-              <a:t>7/11/23</a:t>
+              <a:t>3/3/24</a:t>
             </a:fld>
             <a:endParaRPr lang="en-US"/>
           </a:p>
@@ -2716,7 +3070,7 @@
           <a:p>
             <a:fld id="{88742C7B-830F-6341-9EBD-E5CBEBE7F2B7}" type="datetimeFigureOut">
               <a:rPr lang="en-US" smtClean="0"/>
-              <a:t>7/11/23</a:t>
+              <a:t>3/3/24</a:t>
             </a:fld>
             <a:endParaRPr lang="en-US"/>
           </a:p>
@@ -3422,10 +3776,10 @@
       </p:grpSpPr>
       <p:grpSp>
         <p:nvGrpSpPr>
-          <p:cNvPr id="42" name="Group 41">
+          <p:cNvPr id="105" name="Group 104">
             <a:extLst>
               <a:ext uri="{FF2B5EF4-FFF2-40B4-BE49-F238E27FC236}">
-                <a16:creationId xmlns:a16="http://schemas.microsoft.com/office/drawing/2014/main" id="{E7F1D8F6-78AD-6214-888A-FB5190BCB552}"/>
+                <a16:creationId xmlns:a16="http://schemas.microsoft.com/office/drawing/2014/main" id="{3FCCED14-E096-3E4B-DD4D-FE4266A2DA39}"/>
               </a:ext>
             </a:extLst>
           </p:cNvPr>
@@ -3434,18 +3788,1144 @@
         </p:nvGrpSpPr>
         <p:grpSpPr>
           <a:xfrm>
-            <a:off x="4205742" y="4702232"/>
-            <a:ext cx="1082065" cy="1100853"/>
-            <a:chOff x="4205742" y="4702232"/>
-            <a:chExt cx="1082065" cy="1100853"/>
+            <a:off x="1442288" y="1977493"/>
+            <a:ext cx="4784099" cy="1875192"/>
+            <a:chOff x="1442288" y="1977493"/>
+            <a:chExt cx="4784099" cy="1875192"/>
           </a:xfrm>
         </p:grpSpPr>
+        <p:grpSp>
+          <p:nvGrpSpPr>
+            <p:cNvPr id="47" name="Group 46">
+              <a:extLst>
+                <a:ext uri="{FF2B5EF4-FFF2-40B4-BE49-F238E27FC236}">
+                  <a16:creationId xmlns:a16="http://schemas.microsoft.com/office/drawing/2014/main" id="{47BD8AD9-7916-3C93-C277-8005A1DC1AF4}"/>
+                </a:ext>
+              </a:extLst>
+            </p:cNvPr>
+            <p:cNvGrpSpPr/>
+            <p:nvPr/>
+          </p:nvGrpSpPr>
+          <p:grpSpPr>
+            <a:xfrm>
+              <a:off x="1442288" y="1977493"/>
+              <a:ext cx="4784099" cy="1875192"/>
+              <a:chOff x="1396568" y="1960209"/>
+              <a:chExt cx="4784099" cy="1875192"/>
+            </a:xfrm>
+          </p:grpSpPr>
+          <p:sp>
+            <p:nvSpPr>
+              <p:cNvPr id="46" name="Rectangle 45">
+                <a:extLst>
+                  <a:ext uri="{FF2B5EF4-FFF2-40B4-BE49-F238E27FC236}">
+                    <a16:creationId xmlns:a16="http://schemas.microsoft.com/office/drawing/2014/main" id="{9E8194F6-5862-62DF-CBEC-5294BA2CB594}"/>
+                  </a:ext>
+                </a:extLst>
+              </p:cNvPr>
+              <p:cNvSpPr/>
+              <p:nvPr/>
+            </p:nvSpPr>
+            <p:spPr>
+              <a:xfrm>
+                <a:off x="1506296" y="2005813"/>
+                <a:ext cx="4674371" cy="1829588"/>
+              </a:xfrm>
+              <a:prstGeom prst="rect">
+                <a:avLst/>
+              </a:prstGeom>
+              <a:solidFill>
+                <a:schemeClr val="bg1"/>
+              </a:solidFill>
+              <a:ln>
+                <a:noFill/>
+              </a:ln>
+              <a:effectLst/>
+            </p:spPr>
+            <p:style>
+              <a:lnRef idx="1">
+                <a:schemeClr val="accent1"/>
+              </a:lnRef>
+              <a:fillRef idx="3">
+                <a:schemeClr val="accent1"/>
+              </a:fillRef>
+              <a:effectRef idx="2">
+                <a:schemeClr val="accent1"/>
+              </a:effectRef>
+              <a:fontRef idx="minor">
+                <a:schemeClr val="lt1"/>
+              </a:fontRef>
+            </p:style>
+            <p:txBody>
+              <a:bodyPr rtlCol="0" anchor="ctr"/>
+              <a:lstStyle/>
+              <a:p>
+                <a:pPr algn="ctr"/>
+                <a:endParaRPr lang="en-US"/>
+              </a:p>
+            </p:txBody>
+          </p:sp>
+          <p:grpSp>
+            <p:nvGrpSpPr>
+              <p:cNvPr id="45" name="Group 44">
+                <a:extLst>
+                  <a:ext uri="{FF2B5EF4-FFF2-40B4-BE49-F238E27FC236}">
+                    <a16:creationId xmlns:a16="http://schemas.microsoft.com/office/drawing/2014/main" id="{61A21CF9-FCEF-D3F9-9228-E8C57431023D}"/>
+                  </a:ext>
+                </a:extLst>
+              </p:cNvPr>
+              <p:cNvGrpSpPr/>
+              <p:nvPr/>
+            </p:nvGrpSpPr>
+            <p:grpSpPr>
+              <a:xfrm>
+                <a:off x="1396568" y="1960209"/>
+                <a:ext cx="4674371" cy="1829588"/>
+                <a:chOff x="1396568" y="1960209"/>
+                <a:chExt cx="4674371" cy="1829588"/>
+              </a:xfrm>
+            </p:grpSpPr>
+            <p:sp>
+              <p:nvSpPr>
+                <p:cNvPr id="4" name="Rectangle 3"/>
+                <p:cNvSpPr/>
+                <p:nvPr/>
+              </p:nvSpPr>
+              <p:spPr>
+                <a:xfrm>
+                  <a:off x="1396568" y="1960209"/>
+                  <a:ext cx="4674371" cy="1829588"/>
+                </a:xfrm>
+                <a:prstGeom prst="rect">
+                  <a:avLst/>
+                </a:prstGeom>
+                <a:ln w="3175" cmpd="sng">
+                  <a:solidFill>
+                    <a:schemeClr val="bg1">
+                      <a:lumMod val="65000"/>
+                    </a:schemeClr>
+                  </a:solidFill>
+                </a:ln>
+                <a:effectLst/>
+              </p:spPr>
+              <p:style>
+                <a:lnRef idx="2">
+                  <a:schemeClr val="dk1"/>
+                </a:lnRef>
+                <a:fillRef idx="1">
+                  <a:schemeClr val="lt1"/>
+                </a:fillRef>
+                <a:effectRef idx="0">
+                  <a:schemeClr val="dk1"/>
+                </a:effectRef>
+                <a:fontRef idx="minor">
+                  <a:schemeClr val="dk1"/>
+                </a:fontRef>
+              </p:style>
+              <p:txBody>
+                <a:bodyPr rtlCol="0" anchor="ctr"/>
+                <a:lstStyle/>
+                <a:p>
+                  <a:pPr algn="ctr"/>
+                  <a:endParaRPr lang="en-US" dirty="0"/>
+                </a:p>
+              </p:txBody>
+            </p:sp>
+            <p:sp>
+              <p:nvSpPr>
+                <p:cNvPr id="5" name="Rectangle 4"/>
+                <p:cNvSpPr/>
+                <p:nvPr/>
+              </p:nvSpPr>
+              <p:spPr>
+                <a:xfrm>
+                  <a:off x="1490468" y="2192221"/>
+                  <a:ext cx="3538149" cy="1446550"/>
+                </a:xfrm>
+                <a:prstGeom prst="rect">
+                  <a:avLst/>
+                </a:prstGeom>
+                <a:noFill/>
+              </p:spPr>
+              <p:txBody>
+                <a:bodyPr wrap="none" lIns="91440" tIns="45720" rIns="91440" bIns="45720">
+                  <a:spAutoFit/>
+                </a:bodyPr>
+                <a:lstStyle/>
+                <a:p>
+                  <a:pPr algn="ctr"/>
+                  <a:r>
+                    <a:rPr lang="en-US" sz="8800" b="1" cap="none" spc="0" dirty="0" err="1">
+                      <a:ln w="12700">
+                        <a:solidFill>
+                          <a:srgbClr val="1B8585"/>
+                        </a:solidFill>
+                        <a:prstDash val="solid"/>
+                      </a:ln>
+                      <a:solidFill>
+                        <a:srgbClr val="1B8585">
+                          <a:alpha val="34144"/>
+                        </a:srgbClr>
+                      </a:solidFill>
+                      <a:effectLst>
+                        <a:outerShdw blurRad="41275" dist="20320" dir="1800000" algn="tl" rotWithShape="0">
+                          <a:srgbClr val="000000">
+                            <a:alpha val="40000"/>
+                          </a:srgbClr>
+                        </a:outerShdw>
+                      </a:effectLst>
+                    </a:rPr>
+                    <a:t>BioRAF</a:t>
+                  </a:r>
+                  <a:endParaRPr lang="en-US" sz="7200" b="1" cap="none" spc="0" dirty="0">
+                    <a:ln w="12700">
+                      <a:solidFill>
+                        <a:srgbClr val="1B8585"/>
+                      </a:solidFill>
+                      <a:prstDash val="solid"/>
+                    </a:ln>
+                    <a:solidFill>
+                      <a:srgbClr val="1B8585">
+                        <a:alpha val="34144"/>
+                      </a:srgbClr>
+                    </a:solidFill>
+                    <a:effectLst>
+                      <a:outerShdw blurRad="41275" dist="20320" dir="1800000" algn="tl" rotWithShape="0">
+                        <a:srgbClr val="000000">
+                          <a:alpha val="40000"/>
+                        </a:srgbClr>
+                      </a:outerShdw>
+                    </a:effectLst>
+                  </a:endParaRPr>
+                </a:p>
+              </p:txBody>
+            </p:sp>
+            <p:sp>
+              <p:nvSpPr>
+                <p:cNvPr id="6" name="TextBox 5"/>
+                <p:cNvSpPr txBox="1"/>
+                <p:nvPr/>
+              </p:nvSpPr>
+              <p:spPr>
+                <a:xfrm>
+                  <a:off x="1732533" y="3326704"/>
+                  <a:ext cx="3161480" cy="369332"/>
+                </a:xfrm>
+                <a:prstGeom prst="rect">
+                  <a:avLst/>
+                </a:prstGeom>
+                <a:noFill/>
+              </p:spPr>
+              <p:txBody>
+                <a:bodyPr wrap="none" rtlCol="0">
+                  <a:spAutoFit/>
+                </a:bodyPr>
+                <a:lstStyle/>
+                <a:p>
+                  <a:r>
+                    <a:rPr lang="en-US" dirty="0">
+                      <a:solidFill>
+                        <a:srgbClr val="4D4D4A"/>
+                      </a:solidFill>
+                      <a:latin typeface="Arial"/>
+                      <a:cs typeface="Arial"/>
+                    </a:rPr>
+                    <a:t>Daniel Huson and Mike Steel</a:t>
+                  </a:r>
+                </a:p>
+              </p:txBody>
+            </p:sp>
+          </p:grpSp>
+        </p:grpSp>
+        <p:pic>
+          <p:nvPicPr>
+            <p:cNvPr id="104" name="Picture 103" descr="BioRAF icon">
+              <a:extLst>
+                <a:ext uri="{FF2B5EF4-FFF2-40B4-BE49-F238E27FC236}">
+                  <a16:creationId xmlns:a16="http://schemas.microsoft.com/office/drawing/2014/main" id="{4C6DF482-C49B-9ABD-DC2C-7F27154A6253}"/>
+                </a:ext>
+              </a:extLst>
+            </p:cNvPr>
+            <p:cNvPicPr>
+              <a:picLocks noChangeAspect="1"/>
+            </p:cNvPicPr>
+            <p:nvPr/>
+          </p:nvPicPr>
+          <p:blipFill>
+            <a:blip r:embed="rId2">
+              <a:extLst>
+                <a:ext uri="{BEBA8EAE-BF5A-486C-A8C5-ECC9F3942E4B}">
+                  <a14:imgProps xmlns:a14="http://schemas.microsoft.com/office/drawing/2010/main">
+                    <a14:imgLayer r:embed="rId3">
+                      <a14:imgEffect>
+                        <a14:backgroundRemoval t="7101" b="90861" l="7779" r="91430">
+                          <a14:foregroundMark x1="10415" y1="8941" x2="22149" y2="9796"/>
+                          <a14:foregroundMark x1="22149" y1="9796" x2="25181" y2="23669"/>
+                          <a14:foregroundMark x1="6987" y1="11111" x2="8701" y2="22485"/>
+                          <a14:foregroundMark x1="8701" y1="22485" x2="9163" y2="23471"/>
+                          <a14:foregroundMark x1="8042" y1="25378" x2="19776" y2="24852"/>
+                          <a14:foregroundMark x1="19776" y1="24852" x2="21094" y2="24326"/>
+                          <a14:foregroundMark x1="8701" y1="7692" x2="20237" y2="7692"/>
+                          <a14:foregroundMark x1="20237" y1="7692" x2="25840" y2="15319"/>
+                          <a14:foregroundMark x1="27093" y1="16634" x2="39288" y2="16700"/>
+                          <a14:foregroundMark x1="39288" y1="16700" x2="51088" y2="16371"/>
+                          <a14:foregroundMark x1="51088" y1="16371" x2="69875" y2="16831"/>
+                          <a14:foregroundMark x1="60053" y1="11308" x2="67765" y2="16174"/>
+                          <a14:foregroundMark x1="60712" y1="23866" x2="70732" y2="18146"/>
+                          <a14:foregroundMark x1="70732" y1="18146" x2="71786" y2="17028"/>
+                          <a14:foregroundMark x1="71786" y1="17028" x2="83388" y2="17028"/>
+                          <a14:foregroundMark x1="83388" y1="17028" x2="90442" y2="16437"/>
+                          <a14:foregroundMark x1="74621" y1="11506" x2="78906" y2="22288"/>
+                          <a14:foregroundMark x1="78906" y1="22288" x2="90310" y2="22814"/>
+                          <a14:foregroundMark x1="90310" y1="22814" x2="91167" y2="10059"/>
+                          <a14:foregroundMark x1="91167" y1="10059" x2="79499" y2="7232"/>
+                          <a14:foregroundMark x1="79499" y1="7232" x2="75016" y2="10256"/>
+                          <a14:foregroundMark x1="91299" y1="10848" x2="91496" y2="22880"/>
+                          <a14:foregroundMark x1="91496" y1="22880" x2="79960" y2="24063"/>
+                          <a14:foregroundMark x1="79960" y1="24063" x2="76730" y2="19592"/>
+                          <a14:foregroundMark x1="82531" y1="28797" x2="84443" y2="90861"/>
+                          <a14:foregroundMark x1="8306" y1="75937" x2="8899" y2="87442"/>
+                          <a14:foregroundMark x1="8899" y1="87442" x2="23467" y2="90598"/>
+                        </a14:backgroundRemoval>
+                      </a14:imgEffect>
+                    </a14:imgLayer>
+                  </a14:imgProps>
+                </a:ext>
+              </a:extLst>
+            </a:blip>
+            <a:stretch>
+              <a:fillRect/>
+            </a:stretch>
+          </p:blipFill>
+          <p:spPr>
+            <a:xfrm>
+              <a:off x="5121181" y="2531920"/>
+              <a:ext cx="853837" cy="856424"/>
+            </a:xfrm>
+            <a:prstGeom prst="rect">
+              <a:avLst/>
+            </a:prstGeom>
+          </p:spPr>
+        </p:pic>
+      </p:grpSp>
+    </p:spTree>
+    <p:extLst>
+      <p:ext uri="{BB962C8B-B14F-4D97-AF65-F5344CB8AC3E}">
+        <p14:creationId xmlns:p14="http://schemas.microsoft.com/office/powerpoint/2010/main" val="972316659"/>
+      </p:ext>
+    </p:extLst>
+  </p:cSld>
+  <p:clrMapOvr>
+    <a:masterClrMapping/>
+  </p:clrMapOvr>
+</p:sld>
+</file>
+
+<file path=ppt/slides/slide3.xml><?xml version="1.0" encoding="utf-8"?>
+<p:sld xmlns:a="http://schemas.openxmlformats.org/drawingml/2006/main" xmlns:r="http://schemas.openxmlformats.org/officeDocument/2006/relationships" xmlns:p="http://schemas.openxmlformats.org/presentationml/2006/main">
+  <p:cSld>
+    <p:spTree>
+      <p:nvGrpSpPr>
+        <p:cNvPr id="1" name=""/>
+        <p:cNvGrpSpPr/>
+        <p:nvPr/>
+      </p:nvGrpSpPr>
+      <p:grpSpPr>
+        <a:xfrm>
+          <a:off x="0" y="0"/>
+          <a:ext cx="0" cy="0"/>
+          <a:chOff x="0" y="0"/>
+          <a:chExt cx="0" cy="0"/>
+        </a:xfrm>
+      </p:grpSpPr>
+      <p:grpSp>
+        <p:nvGrpSpPr>
+          <p:cNvPr id="29" name="Group 28">
+            <a:extLst>
+              <a:ext uri="{FF2B5EF4-FFF2-40B4-BE49-F238E27FC236}">
+                <a16:creationId xmlns:a16="http://schemas.microsoft.com/office/drawing/2014/main" id="{E222E3CE-0DF4-06F6-B660-7C11A889BF9A}"/>
+              </a:ext>
+            </a:extLst>
+          </p:cNvPr>
+          <p:cNvGrpSpPr/>
+          <p:nvPr/>
+        </p:nvGrpSpPr>
+        <p:grpSpPr>
+          <a:xfrm>
+            <a:off x="2472338" y="791686"/>
+            <a:ext cx="3471262" cy="3518960"/>
+            <a:chOff x="3315020" y="1975027"/>
+            <a:chExt cx="3471262" cy="3518960"/>
+          </a:xfrm>
+        </p:grpSpPr>
+        <p:grpSp>
+          <p:nvGrpSpPr>
+            <p:cNvPr id="3" name="Group 2">
+              <a:extLst>
+                <a:ext uri="{FF2B5EF4-FFF2-40B4-BE49-F238E27FC236}">
+                  <a16:creationId xmlns:a16="http://schemas.microsoft.com/office/drawing/2014/main" id="{2C516F4A-74A5-9DF0-426B-75FDCC6844FC}"/>
+                </a:ext>
+              </a:extLst>
+            </p:cNvPr>
+            <p:cNvGrpSpPr/>
+            <p:nvPr/>
+          </p:nvGrpSpPr>
+          <p:grpSpPr>
+            <a:xfrm>
+              <a:off x="3346516" y="2013847"/>
+              <a:ext cx="3420744" cy="3480140"/>
+              <a:chOff x="4205742" y="4702232"/>
+              <a:chExt cx="1082065" cy="1100853"/>
+            </a:xfrm>
+          </p:grpSpPr>
+          <p:sp>
+            <p:nvSpPr>
+              <p:cNvPr id="12" name="Rectangle 11">
+                <a:extLst>
+                  <a:ext uri="{FF2B5EF4-FFF2-40B4-BE49-F238E27FC236}">
+                    <a16:creationId xmlns:a16="http://schemas.microsoft.com/office/drawing/2014/main" id="{1F484B82-C076-46DD-F78B-6FC3C5B1B54C}"/>
+                  </a:ext>
+                </a:extLst>
+              </p:cNvPr>
+              <p:cNvSpPr/>
+              <p:nvPr/>
+            </p:nvSpPr>
+            <p:spPr>
+              <a:xfrm>
+                <a:off x="4308688" y="4808205"/>
+                <a:ext cx="876173" cy="897990"/>
+              </a:xfrm>
+              <a:prstGeom prst="rect">
+                <a:avLst/>
+              </a:prstGeom>
+              <a:solidFill>
+                <a:schemeClr val="bg1"/>
+              </a:solidFill>
+              <a:ln>
+                <a:noFill/>
+              </a:ln>
+              <a:effectLst/>
+            </p:spPr>
+            <p:style>
+              <a:lnRef idx="1">
+                <a:schemeClr val="accent1"/>
+              </a:lnRef>
+              <a:fillRef idx="3">
+                <a:schemeClr val="accent1"/>
+              </a:fillRef>
+              <a:effectRef idx="2">
+                <a:schemeClr val="accent1"/>
+              </a:effectRef>
+              <a:fontRef idx="minor">
+                <a:schemeClr val="lt1"/>
+              </a:fontRef>
+            </p:style>
+            <p:txBody>
+              <a:bodyPr rtlCol="0" anchor="ctr"/>
+              <a:lstStyle/>
+              <a:p>
+                <a:pPr algn="ctr"/>
+                <a:endParaRPr lang="en-US"/>
+              </a:p>
+            </p:txBody>
+          </p:sp>
+          <p:grpSp>
+            <p:nvGrpSpPr>
+              <p:cNvPr id="13" name="Group 12">
+                <a:extLst>
+                  <a:ext uri="{FF2B5EF4-FFF2-40B4-BE49-F238E27FC236}">
+                    <a16:creationId xmlns:a16="http://schemas.microsoft.com/office/drawing/2014/main" id="{A403AD98-2D80-11E1-5328-CFD29AF6251D}"/>
+                  </a:ext>
+                </a:extLst>
+              </p:cNvPr>
+              <p:cNvGrpSpPr/>
+              <p:nvPr/>
+            </p:nvGrpSpPr>
+            <p:grpSpPr>
+              <a:xfrm>
+                <a:off x="4205742" y="4702232"/>
+                <a:ext cx="1082065" cy="1100853"/>
+                <a:chOff x="4205742" y="4702232"/>
+                <a:chExt cx="1082065" cy="1100853"/>
+              </a:xfrm>
+            </p:grpSpPr>
+            <p:grpSp>
+              <p:nvGrpSpPr>
+                <p:cNvPr id="14" name="Group 13">
+                  <a:extLst>
+                    <a:ext uri="{FF2B5EF4-FFF2-40B4-BE49-F238E27FC236}">
+                      <a16:creationId xmlns:a16="http://schemas.microsoft.com/office/drawing/2014/main" id="{ED687906-4DC7-6EFB-CF28-6B797AE33D25}"/>
+                    </a:ext>
+                  </a:extLst>
+                </p:cNvPr>
+                <p:cNvGrpSpPr/>
+                <p:nvPr/>
+              </p:nvGrpSpPr>
+              <p:grpSpPr>
+                <a:xfrm flipV="1">
+                  <a:off x="4205742" y="4702232"/>
+                  <a:ext cx="1082065" cy="1100853"/>
+                  <a:chOff x="4193630" y="4787013"/>
+                  <a:chExt cx="1082065" cy="1100853"/>
+                </a:xfrm>
+              </p:grpSpPr>
+              <p:cxnSp>
+                <p:nvCxnSpPr>
+                  <p:cNvPr id="20" name="Straight Arrow Connector 19">
+                    <a:extLst>
+                      <a:ext uri="{FF2B5EF4-FFF2-40B4-BE49-F238E27FC236}">
+                        <a16:creationId xmlns:a16="http://schemas.microsoft.com/office/drawing/2014/main" id="{3DE2BA8B-BDF5-FAC6-7341-7296D0C8B501}"/>
+                      </a:ext>
+                    </a:extLst>
+                  </p:cNvPr>
+                  <p:cNvCxnSpPr>
+                    <a:stCxn id="25" idx="2"/>
+                    <a:endCxn id="27" idx="0"/>
+                  </p:cNvCxnSpPr>
+                  <p:nvPr/>
+                </p:nvCxnSpPr>
+                <p:spPr>
+                  <a:xfrm>
+                    <a:off x="4296576" y="4998960"/>
+                    <a:ext cx="0" cy="676959"/>
+                  </a:xfrm>
+                  <a:prstGeom prst="straightConnector1">
+                    <a:avLst/>
+                  </a:prstGeom>
+                  <a:ln w="38100">
+                    <a:solidFill>
+                      <a:srgbClr val="1B8585"/>
+                    </a:solidFill>
+                    <a:tailEnd type="triangle" w="lg" len="lg"/>
+                  </a:ln>
+                  <a:effectLst/>
+                </p:spPr>
+                <p:style>
+                  <a:lnRef idx="2">
+                    <a:schemeClr val="accent1"/>
+                  </a:lnRef>
+                  <a:fillRef idx="0">
+                    <a:schemeClr val="accent1"/>
+                  </a:fillRef>
+                  <a:effectRef idx="1">
+                    <a:schemeClr val="accent1"/>
+                  </a:effectRef>
+                  <a:fontRef idx="minor">
+                    <a:schemeClr val="tx1"/>
+                  </a:fontRef>
+                </p:style>
+              </p:cxnSp>
+              <p:cxnSp>
+                <p:nvCxnSpPr>
+                  <p:cNvPr id="21" name="Straight Arrow Connector 20">
+                    <a:extLst>
+                      <a:ext uri="{FF2B5EF4-FFF2-40B4-BE49-F238E27FC236}">
+                        <a16:creationId xmlns:a16="http://schemas.microsoft.com/office/drawing/2014/main" id="{1AC459F3-80DB-E6A1-A617-C893A16D8519}"/>
+                      </a:ext>
+                    </a:extLst>
+                  </p:cNvPr>
+                  <p:cNvCxnSpPr>
+                    <a:cxnSpLocks/>
+                    <a:stCxn id="26" idx="2"/>
+                    <a:endCxn id="24" idx="0"/>
+                  </p:cNvCxnSpPr>
+                  <p:nvPr/>
+                </p:nvCxnSpPr>
+                <p:spPr>
+                  <a:xfrm>
+                    <a:off x="5172749" y="4998960"/>
+                    <a:ext cx="0" cy="676959"/>
+                  </a:xfrm>
+                  <a:prstGeom prst="straightConnector1">
+                    <a:avLst/>
+                  </a:prstGeom>
+                  <a:ln w="38100">
+                    <a:solidFill>
+                      <a:srgbClr val="1B8585"/>
+                    </a:solidFill>
+                    <a:tailEnd type="triangle" w="lg" len="lg"/>
+                  </a:ln>
+                  <a:effectLst/>
+                </p:spPr>
+                <p:style>
+                  <a:lnRef idx="2">
+                    <a:schemeClr val="accent1"/>
+                  </a:lnRef>
+                  <a:fillRef idx="0">
+                    <a:schemeClr val="accent1"/>
+                  </a:fillRef>
+                  <a:effectRef idx="1">
+                    <a:schemeClr val="accent1"/>
+                  </a:effectRef>
+                  <a:fontRef idx="minor">
+                    <a:schemeClr val="tx1"/>
+                  </a:fontRef>
+                </p:style>
+              </p:cxnSp>
+              <p:cxnSp>
+                <p:nvCxnSpPr>
+                  <p:cNvPr id="22" name="Straight Arrow Connector 21">
+                    <a:extLst>
+                      <a:ext uri="{FF2B5EF4-FFF2-40B4-BE49-F238E27FC236}">
+                        <a16:creationId xmlns:a16="http://schemas.microsoft.com/office/drawing/2014/main" id="{F838D006-C61C-88B1-7D17-1A10071DABB4}"/>
+                      </a:ext>
+                    </a:extLst>
+                  </p:cNvPr>
+                  <p:cNvCxnSpPr>
+                    <a:cxnSpLocks/>
+                    <a:stCxn id="25" idx="3"/>
+                    <a:endCxn id="26" idx="1"/>
+                  </p:cNvCxnSpPr>
+                  <p:nvPr/>
+                </p:nvCxnSpPr>
+                <p:spPr>
+                  <a:xfrm>
+                    <a:off x="4399522" y="4892987"/>
+                    <a:ext cx="670281" cy="0"/>
+                  </a:xfrm>
+                  <a:prstGeom prst="straightConnector1">
+                    <a:avLst/>
+                  </a:prstGeom>
+                  <a:ln w="38100">
+                    <a:solidFill>
+                      <a:srgbClr val="1B8585"/>
+                    </a:solidFill>
+                    <a:tailEnd type="triangle" w="lg" len="lg"/>
+                  </a:ln>
+                  <a:effectLst/>
+                </p:spPr>
+                <p:style>
+                  <a:lnRef idx="2">
+                    <a:schemeClr val="accent1"/>
+                  </a:lnRef>
+                  <a:fillRef idx="0">
+                    <a:schemeClr val="accent1"/>
+                  </a:fillRef>
+                  <a:effectRef idx="1">
+                    <a:schemeClr val="accent1"/>
+                  </a:effectRef>
+                  <a:fontRef idx="minor">
+                    <a:schemeClr val="tx1"/>
+                  </a:fontRef>
+                </p:style>
+              </p:cxnSp>
+              <p:cxnSp>
+                <p:nvCxnSpPr>
+                  <p:cNvPr id="23" name="Straight Arrow Connector 22">
+                    <a:extLst>
+                      <a:ext uri="{FF2B5EF4-FFF2-40B4-BE49-F238E27FC236}">
+                        <a16:creationId xmlns:a16="http://schemas.microsoft.com/office/drawing/2014/main" id="{5648647C-C749-3F06-AD43-6E2664D6F055}"/>
+                      </a:ext>
+                    </a:extLst>
+                  </p:cNvPr>
+                  <p:cNvCxnSpPr>
+                    <a:cxnSpLocks/>
+                    <a:stCxn id="27" idx="3"/>
+                    <a:endCxn id="24" idx="1"/>
+                  </p:cNvCxnSpPr>
+                  <p:nvPr/>
+                </p:nvCxnSpPr>
+                <p:spPr>
+                  <a:xfrm>
+                    <a:off x="4399522" y="5781893"/>
+                    <a:ext cx="670281" cy="0"/>
+                  </a:xfrm>
+                  <a:prstGeom prst="straightConnector1">
+                    <a:avLst/>
+                  </a:prstGeom>
+                  <a:ln w="38100">
+                    <a:solidFill>
+                      <a:srgbClr val="1B8585"/>
+                    </a:solidFill>
+                    <a:tailEnd type="triangle" w="lg" len="lg"/>
+                  </a:ln>
+                  <a:effectLst/>
+                </p:spPr>
+                <p:style>
+                  <a:lnRef idx="2">
+                    <a:schemeClr val="accent1"/>
+                  </a:lnRef>
+                  <a:fillRef idx="0">
+                    <a:schemeClr val="accent1"/>
+                  </a:fillRef>
+                  <a:effectRef idx="1">
+                    <a:schemeClr val="accent1"/>
+                  </a:effectRef>
+                  <a:fontRef idx="minor">
+                    <a:schemeClr val="tx1"/>
+                  </a:fontRef>
+                </p:style>
+              </p:cxnSp>
+              <p:sp>
+                <p:nvSpPr>
+                  <p:cNvPr id="24" name="Rounded Rectangle 23">
+                    <a:extLst>
+                      <a:ext uri="{FF2B5EF4-FFF2-40B4-BE49-F238E27FC236}">
+                        <a16:creationId xmlns:a16="http://schemas.microsoft.com/office/drawing/2014/main" id="{6E5DCF5E-EA81-57C4-0DDE-9D6C05E2FE2F}"/>
+                      </a:ext>
+                    </a:extLst>
+                  </p:cNvPr>
+                  <p:cNvSpPr/>
+                  <p:nvPr/>
+                </p:nvSpPr>
+                <p:spPr>
+                  <a:xfrm>
+                    <a:off x="5069803" y="5675919"/>
+                    <a:ext cx="205892" cy="211947"/>
+                  </a:xfrm>
+                  <a:prstGeom prst="roundRect">
+                    <a:avLst/>
+                  </a:prstGeom>
+                  <a:solidFill>
+                    <a:schemeClr val="bg1"/>
+                  </a:solidFill>
+                  <a:ln w="38100">
+                    <a:solidFill>
+                      <a:srgbClr val="1B8585"/>
+                    </a:solidFill>
+                  </a:ln>
+                  <a:effectLst/>
+                </p:spPr>
+                <p:style>
+                  <a:lnRef idx="1">
+                    <a:schemeClr val="accent1"/>
+                  </a:lnRef>
+                  <a:fillRef idx="3">
+                    <a:schemeClr val="accent1"/>
+                  </a:fillRef>
+                  <a:effectRef idx="2">
+                    <a:schemeClr val="accent1"/>
+                  </a:effectRef>
+                  <a:fontRef idx="minor">
+                    <a:schemeClr val="lt1"/>
+                  </a:fontRef>
+                </p:style>
+                <p:txBody>
+                  <a:bodyPr rtlCol="0" anchor="ctr"/>
+                  <a:lstStyle/>
+                  <a:p>
+                    <a:pPr algn="ctr"/>
+                    <a:endParaRPr lang="en-US"/>
+                  </a:p>
+                </p:txBody>
+              </p:sp>
+              <p:sp>
+                <p:nvSpPr>
+                  <p:cNvPr id="25" name="Rounded Rectangle 24">
+                    <a:extLst>
+                      <a:ext uri="{FF2B5EF4-FFF2-40B4-BE49-F238E27FC236}">
+                        <a16:creationId xmlns:a16="http://schemas.microsoft.com/office/drawing/2014/main" id="{2844C40E-905F-D9B3-55A0-8EDB1654C2D7}"/>
+                      </a:ext>
+                    </a:extLst>
+                  </p:cNvPr>
+                  <p:cNvSpPr/>
+                  <p:nvPr/>
+                </p:nvSpPr>
+                <p:spPr>
+                  <a:xfrm>
+                    <a:off x="4193630" y="4787013"/>
+                    <a:ext cx="205892" cy="211947"/>
+                  </a:xfrm>
+                  <a:prstGeom prst="roundRect">
+                    <a:avLst/>
+                  </a:prstGeom>
+                  <a:solidFill>
+                    <a:schemeClr val="bg1"/>
+                  </a:solidFill>
+                  <a:ln w="38100">
+                    <a:solidFill>
+                      <a:srgbClr val="1B8585"/>
+                    </a:solidFill>
+                  </a:ln>
+                  <a:effectLst/>
+                </p:spPr>
+                <p:style>
+                  <a:lnRef idx="1">
+                    <a:schemeClr val="accent1"/>
+                  </a:lnRef>
+                  <a:fillRef idx="3">
+                    <a:schemeClr val="accent1"/>
+                  </a:fillRef>
+                  <a:effectRef idx="2">
+                    <a:schemeClr val="accent1"/>
+                  </a:effectRef>
+                  <a:fontRef idx="minor">
+                    <a:schemeClr val="lt1"/>
+                  </a:fontRef>
+                </p:style>
+                <p:txBody>
+                  <a:bodyPr rtlCol="0" anchor="ctr"/>
+                  <a:lstStyle/>
+                  <a:p>
+                    <a:pPr algn="ctr"/>
+                    <a:endParaRPr lang="en-US"/>
+                  </a:p>
+                </p:txBody>
+              </p:sp>
+              <p:sp>
+                <p:nvSpPr>
+                  <p:cNvPr id="26" name="Rounded Rectangle 25">
+                    <a:extLst>
+                      <a:ext uri="{FF2B5EF4-FFF2-40B4-BE49-F238E27FC236}">
+                        <a16:creationId xmlns:a16="http://schemas.microsoft.com/office/drawing/2014/main" id="{17476BAB-EEC3-E89C-39AA-7C9CF7877D13}"/>
+                      </a:ext>
+                    </a:extLst>
+                  </p:cNvPr>
+                  <p:cNvSpPr/>
+                  <p:nvPr/>
+                </p:nvSpPr>
+                <p:spPr>
+                  <a:xfrm>
+                    <a:off x="5069803" y="4787013"/>
+                    <a:ext cx="205892" cy="211947"/>
+                  </a:xfrm>
+                  <a:prstGeom prst="roundRect">
+                    <a:avLst/>
+                  </a:prstGeom>
+                  <a:solidFill>
+                    <a:schemeClr val="bg1"/>
+                  </a:solidFill>
+                  <a:ln w="38100">
+                    <a:solidFill>
+                      <a:srgbClr val="1B8585"/>
+                    </a:solidFill>
+                  </a:ln>
+                  <a:effectLst/>
+                </p:spPr>
+                <p:style>
+                  <a:lnRef idx="1">
+                    <a:schemeClr val="accent1"/>
+                  </a:lnRef>
+                  <a:fillRef idx="3">
+                    <a:schemeClr val="accent1"/>
+                  </a:fillRef>
+                  <a:effectRef idx="2">
+                    <a:schemeClr val="accent1"/>
+                  </a:effectRef>
+                  <a:fontRef idx="minor">
+                    <a:schemeClr val="lt1"/>
+                  </a:fontRef>
+                </p:style>
+                <p:txBody>
+                  <a:bodyPr rtlCol="0" anchor="ctr"/>
+                  <a:lstStyle/>
+                  <a:p>
+                    <a:pPr algn="ctr"/>
+                    <a:endParaRPr lang="en-US"/>
+                  </a:p>
+                </p:txBody>
+              </p:sp>
+              <p:sp>
+                <p:nvSpPr>
+                  <p:cNvPr id="27" name="Rounded Rectangle 26">
+                    <a:extLst>
+                      <a:ext uri="{FF2B5EF4-FFF2-40B4-BE49-F238E27FC236}">
+                        <a16:creationId xmlns:a16="http://schemas.microsoft.com/office/drawing/2014/main" id="{E79FD2C7-E3F0-6BCB-71CC-A6C22B3FCF48}"/>
+                      </a:ext>
+                    </a:extLst>
+                  </p:cNvPr>
+                  <p:cNvSpPr/>
+                  <p:nvPr/>
+                </p:nvSpPr>
+                <p:spPr>
+                  <a:xfrm>
+                    <a:off x="4193630" y="5675919"/>
+                    <a:ext cx="205892" cy="211947"/>
+                  </a:xfrm>
+                  <a:prstGeom prst="roundRect">
+                    <a:avLst/>
+                  </a:prstGeom>
+                  <a:solidFill>
+                    <a:schemeClr val="bg1"/>
+                  </a:solidFill>
+                  <a:ln w="38100">
+                    <a:solidFill>
+                      <a:srgbClr val="1B8585"/>
+                    </a:solidFill>
+                  </a:ln>
+                  <a:effectLst/>
+                </p:spPr>
+                <p:style>
+                  <a:lnRef idx="1">
+                    <a:schemeClr val="accent1"/>
+                  </a:lnRef>
+                  <a:fillRef idx="3">
+                    <a:schemeClr val="accent1"/>
+                  </a:fillRef>
+                  <a:effectRef idx="2">
+                    <a:schemeClr val="accent1"/>
+                  </a:effectRef>
+                  <a:fontRef idx="minor">
+                    <a:schemeClr val="lt1"/>
+                  </a:fontRef>
+                </p:style>
+                <p:txBody>
+                  <a:bodyPr rtlCol="0" anchor="ctr"/>
+                  <a:lstStyle/>
+                  <a:p>
+                    <a:pPr algn="ctr"/>
+                    <a:endParaRPr lang="en-US"/>
+                  </a:p>
+                </p:txBody>
+              </p:sp>
+            </p:grpSp>
+            <p:sp>
+              <p:nvSpPr>
+                <p:cNvPr id="15" name="Arc 14">
+                  <a:extLst>
+                    <a:ext uri="{FF2B5EF4-FFF2-40B4-BE49-F238E27FC236}">
+                      <a16:creationId xmlns:a16="http://schemas.microsoft.com/office/drawing/2014/main" id="{4C3A60CF-4C4E-B32E-40D0-2E08AE51B0EA}"/>
+                    </a:ext>
+                  </a:extLst>
+                </p:cNvPr>
+                <p:cNvSpPr/>
+                <p:nvPr/>
+              </p:nvSpPr>
+              <p:spPr>
+                <a:xfrm>
+                  <a:off x="4560222" y="5232062"/>
+                  <a:ext cx="361207" cy="474133"/>
+                </a:xfrm>
+                <a:prstGeom prst="arc">
+                  <a:avLst>
+                    <a:gd name="adj1" fmla="val 10977255"/>
+                    <a:gd name="adj2" fmla="val 18076033"/>
+                  </a:avLst>
+                </a:prstGeom>
+                <a:ln w="152400">
+                  <a:solidFill>
+                    <a:schemeClr val="accent2"/>
+                  </a:solidFill>
+                </a:ln>
+                <a:effectLst/>
+              </p:spPr>
+              <p:style>
+                <a:lnRef idx="2">
+                  <a:schemeClr val="accent1"/>
+                </a:lnRef>
+                <a:fillRef idx="0">
+                  <a:schemeClr val="accent1"/>
+                </a:fillRef>
+                <a:effectRef idx="1">
+                  <a:schemeClr val="accent1"/>
+                </a:effectRef>
+                <a:fontRef idx="minor">
+                  <a:schemeClr val="tx1"/>
+                </a:fontRef>
+              </p:style>
+              <p:txBody>
+                <a:bodyPr rtlCol="0" anchor="ctr"/>
+                <a:lstStyle/>
+                <a:p>
+                  <a:pPr algn="ctr"/>
+                  <a:endParaRPr lang="en-US"/>
+                </a:p>
+              </p:txBody>
+            </p:sp>
+            <p:sp>
+              <p:nvSpPr>
+                <p:cNvPr id="16" name="Arc 15">
+                  <a:extLst>
+                    <a:ext uri="{FF2B5EF4-FFF2-40B4-BE49-F238E27FC236}">
+                      <a16:creationId xmlns:a16="http://schemas.microsoft.com/office/drawing/2014/main" id="{3236DD47-BB14-E99E-CC20-07A9FDAD2A4D}"/>
+                    </a:ext>
+                  </a:extLst>
+                </p:cNvPr>
+                <p:cNvSpPr/>
+                <p:nvPr/>
+              </p:nvSpPr>
+              <p:spPr>
+                <a:xfrm>
+                  <a:off x="4557855" y="5027932"/>
+                  <a:ext cx="289486" cy="757899"/>
+                </a:xfrm>
+                <a:prstGeom prst="arc">
+                  <a:avLst>
+                    <a:gd name="adj1" fmla="val 9439057"/>
+                    <a:gd name="adj2" fmla="val 19303908"/>
+                  </a:avLst>
+                </a:prstGeom>
+                <a:ln w="152400">
+                  <a:solidFill>
+                    <a:schemeClr val="bg1">
+                      <a:lumMod val="50000"/>
+                    </a:schemeClr>
+                  </a:solidFill>
+                </a:ln>
+                <a:effectLst/>
+              </p:spPr>
+              <p:style>
+                <a:lnRef idx="2">
+                  <a:schemeClr val="accent1"/>
+                </a:lnRef>
+                <a:fillRef idx="0">
+                  <a:schemeClr val="accent1"/>
+                </a:fillRef>
+                <a:effectRef idx="1">
+                  <a:schemeClr val="accent1"/>
+                </a:effectRef>
+                <a:fontRef idx="minor">
+                  <a:schemeClr val="tx1"/>
+                </a:fontRef>
+              </p:style>
+              <p:txBody>
+                <a:bodyPr rtlCol="0" anchor="ctr"/>
+                <a:lstStyle/>
+                <a:p>
+                  <a:pPr algn="ctr"/>
+                  <a:endParaRPr lang="en-US"/>
+                </a:p>
+              </p:txBody>
+            </p:sp>
+            <p:cxnSp>
+              <p:nvCxnSpPr>
+                <p:cNvPr id="17" name="Straight Connector 16">
+                  <a:extLst>
+                    <a:ext uri="{FF2B5EF4-FFF2-40B4-BE49-F238E27FC236}">
+                      <a16:creationId xmlns:a16="http://schemas.microsoft.com/office/drawing/2014/main" id="{00EC694D-EC6D-134A-4F63-D65C4DFAD6B4}"/>
+                    </a:ext>
+                  </a:extLst>
+                </p:cNvPr>
+                <p:cNvCxnSpPr>
+                  <a:cxnSpLocks/>
+                  <a:endCxn id="15" idx="0"/>
+                </p:cNvCxnSpPr>
+                <p:nvPr/>
+              </p:nvCxnSpPr>
+              <p:spPr>
+                <a:xfrm>
+                  <a:off x="4399522" y="5459815"/>
+                  <a:ext cx="160839" cy="0"/>
+                </a:xfrm>
+                <a:prstGeom prst="line">
+                  <a:avLst/>
+                </a:prstGeom>
+                <a:ln w="152400">
+                  <a:solidFill>
+                    <a:schemeClr val="bg1">
+                      <a:lumMod val="50000"/>
+                    </a:schemeClr>
+                  </a:solidFill>
+                </a:ln>
+                <a:effectLst/>
+              </p:spPr>
+              <p:style>
+                <a:lnRef idx="2">
+                  <a:schemeClr val="accent1"/>
+                </a:lnRef>
+                <a:fillRef idx="0">
+                  <a:schemeClr val="accent1"/>
+                </a:fillRef>
+                <a:effectRef idx="1">
+                  <a:schemeClr val="accent1"/>
+                </a:effectRef>
+                <a:fontRef idx="minor">
+                  <a:schemeClr val="tx1"/>
+                </a:fontRef>
+              </p:style>
+            </p:cxnSp>
+            <p:cxnSp>
+              <p:nvCxnSpPr>
+                <p:cNvPr id="18" name="Straight Connector 17">
+                  <a:extLst>
+                    <a:ext uri="{FF2B5EF4-FFF2-40B4-BE49-F238E27FC236}">
+                      <a16:creationId xmlns:a16="http://schemas.microsoft.com/office/drawing/2014/main" id="{F1C441D2-B435-88D1-2FB1-5C93168B0C84}"/>
+                    </a:ext>
+                  </a:extLst>
+                </p:cNvPr>
+                <p:cNvCxnSpPr>
+                  <a:cxnSpLocks/>
+                </p:cNvCxnSpPr>
+                <p:nvPr/>
+              </p:nvCxnSpPr>
+              <p:spPr>
+                <a:xfrm>
+                  <a:off x="4822199" y="5280910"/>
+                  <a:ext cx="228873" cy="1465"/>
+                </a:xfrm>
+                <a:prstGeom prst="line">
+                  <a:avLst/>
+                </a:prstGeom>
+                <a:ln w="152400">
+                  <a:solidFill>
+                    <a:schemeClr val="bg1">
+                      <a:lumMod val="50000"/>
+                    </a:schemeClr>
+                  </a:solidFill>
+                </a:ln>
+                <a:effectLst/>
+              </p:spPr>
+              <p:style>
+                <a:lnRef idx="2">
+                  <a:schemeClr val="accent1"/>
+                </a:lnRef>
+                <a:fillRef idx="0">
+                  <a:schemeClr val="accent1"/>
+                </a:fillRef>
+                <a:effectRef idx="1">
+                  <a:schemeClr val="accent1"/>
+                </a:effectRef>
+                <a:fontRef idx="minor">
+                  <a:schemeClr val="tx1"/>
+                </a:fontRef>
+              </p:style>
+            </p:cxnSp>
+            <p:cxnSp>
+              <p:nvCxnSpPr>
+                <p:cNvPr id="19" name="Straight Connector 18">
+                  <a:extLst>
+                    <a:ext uri="{FF2B5EF4-FFF2-40B4-BE49-F238E27FC236}">
+                      <a16:creationId xmlns:a16="http://schemas.microsoft.com/office/drawing/2014/main" id="{3556F59B-739D-9CEC-41CC-F4CC276FCD86}"/>
+                    </a:ext>
+                  </a:extLst>
+                </p:cNvPr>
+                <p:cNvCxnSpPr>
+                  <a:cxnSpLocks/>
+                  <a:stCxn id="15" idx="0"/>
+                </p:cNvCxnSpPr>
+                <p:nvPr/>
+              </p:nvCxnSpPr>
+              <p:spPr>
+                <a:xfrm>
+                  <a:off x="4560361" y="5459815"/>
+                  <a:ext cx="509442" cy="0"/>
+                </a:xfrm>
+                <a:prstGeom prst="line">
+                  <a:avLst/>
+                </a:prstGeom>
+                <a:ln w="152400">
+                  <a:solidFill>
+                    <a:schemeClr val="bg1">
+                      <a:lumMod val="50000"/>
+                    </a:schemeClr>
+                  </a:solidFill>
+                  <a:prstDash val="sysDot"/>
+                </a:ln>
+                <a:effectLst/>
+              </p:spPr>
+              <p:style>
+                <a:lnRef idx="2">
+                  <a:schemeClr val="accent1"/>
+                </a:lnRef>
+                <a:fillRef idx="0">
+                  <a:schemeClr val="accent1"/>
+                </a:fillRef>
+                <a:effectRef idx="1">
+                  <a:schemeClr val="accent1"/>
+                </a:effectRef>
+                <a:fontRef idx="minor">
+                  <a:schemeClr val="tx1"/>
+                </a:fontRef>
+              </p:style>
+            </p:cxnSp>
+          </p:grpSp>
+        </p:grpSp>
         <p:sp>
           <p:nvSpPr>
-            <p:cNvPr id="41" name="Rectangle 40">
+            <p:cNvPr id="4" name="Rounded Rectangle 3">
               <a:extLst>
                 <a:ext uri="{FF2B5EF4-FFF2-40B4-BE49-F238E27FC236}">
-                  <a16:creationId xmlns:a16="http://schemas.microsoft.com/office/drawing/2014/main" id="{1145AEF0-FEA8-D34F-0C08-49F11C8B5E76}"/>
+                  <a16:creationId xmlns:a16="http://schemas.microsoft.com/office/drawing/2014/main" id="{15C37D50-5EF7-35FC-FEA9-E199CF414540}"/>
                 </a:ext>
               </a:extLst>
             </p:cNvPr>
@@ -3454,17 +4934,19 @@
           </p:nvSpPr>
           <p:spPr>
             <a:xfrm>
-              <a:off x="4308688" y="4808205"/>
-              <a:ext cx="876173" cy="897990"/>
+              <a:off x="3315020" y="1975027"/>
+              <a:ext cx="675832" cy="675832"/>
             </a:xfrm>
-            <a:prstGeom prst="rect">
+            <a:prstGeom prst="roundRect">
               <a:avLst/>
             </a:prstGeom>
             <a:solidFill>
               <a:schemeClr val="bg1"/>
             </a:solidFill>
-            <a:ln>
-              <a:noFill/>
+            <a:ln w="228600">
+              <a:solidFill>
+                <a:srgbClr val="1B8585"/>
+              </a:solidFill>
             </a:ln>
             <a:effectLst/>
           </p:spPr>
@@ -3491,724 +4973,12 @@
             </a:p>
           </p:txBody>
         </p:sp>
-        <p:grpSp>
-          <p:nvGrpSpPr>
-            <p:cNvPr id="37" name="Group 36">
+        <p:sp>
+          <p:nvSpPr>
+            <p:cNvPr id="5" name="Rounded Rectangle 4">
               <a:extLst>
                 <a:ext uri="{FF2B5EF4-FFF2-40B4-BE49-F238E27FC236}">
-                  <a16:creationId xmlns:a16="http://schemas.microsoft.com/office/drawing/2014/main" id="{2DA1EC81-E606-DB99-1E17-937789FD97B4}"/>
-                </a:ext>
-              </a:extLst>
-            </p:cNvPr>
-            <p:cNvGrpSpPr/>
-            <p:nvPr/>
-          </p:nvGrpSpPr>
-          <p:grpSpPr>
-            <a:xfrm>
-              <a:off x="4205742" y="4702232"/>
-              <a:ext cx="1082065" cy="1100853"/>
-              <a:chOff x="4205742" y="4702232"/>
-              <a:chExt cx="1082065" cy="1100853"/>
-            </a:xfrm>
-          </p:grpSpPr>
-          <p:grpSp>
-            <p:nvGrpSpPr>
-              <p:cNvPr id="36" name="Group 35">
-                <a:extLst>
-                  <a:ext uri="{FF2B5EF4-FFF2-40B4-BE49-F238E27FC236}">
-                    <a16:creationId xmlns:a16="http://schemas.microsoft.com/office/drawing/2014/main" id="{7D9CE8D2-7BEC-E634-50C6-A8C0C0CAE69F}"/>
-                  </a:ext>
-                </a:extLst>
-              </p:cNvPr>
-              <p:cNvGrpSpPr/>
-              <p:nvPr/>
-            </p:nvGrpSpPr>
-            <p:grpSpPr>
-              <a:xfrm flipV="1">
-                <a:off x="4205742" y="4702232"/>
-                <a:ext cx="1082065" cy="1100853"/>
-                <a:chOff x="4193630" y="4787013"/>
-                <a:chExt cx="1082065" cy="1100853"/>
-              </a:xfrm>
-            </p:grpSpPr>
-            <p:cxnSp>
-              <p:nvCxnSpPr>
-                <p:cNvPr id="14" name="Straight Arrow Connector 13">
-                  <a:extLst>
-                    <a:ext uri="{FF2B5EF4-FFF2-40B4-BE49-F238E27FC236}">
-                      <a16:creationId xmlns:a16="http://schemas.microsoft.com/office/drawing/2014/main" id="{F8F7A863-EB6A-ED34-75CB-B66A6639402B}"/>
-                    </a:ext>
-                  </a:extLst>
-                </p:cNvPr>
-                <p:cNvCxnSpPr>
-                  <a:stCxn id="2" idx="2"/>
-                  <a:endCxn id="12" idx="0"/>
-                </p:cNvCxnSpPr>
-                <p:nvPr/>
-              </p:nvCxnSpPr>
-              <p:spPr>
-                <a:xfrm>
-                  <a:off x="4296576" y="4998960"/>
-                  <a:ext cx="0" cy="676959"/>
-                </a:xfrm>
-                <a:prstGeom prst="straightConnector1">
-                  <a:avLst/>
-                </a:prstGeom>
-                <a:ln w="38100">
-                  <a:solidFill>
-                    <a:srgbClr val="1B8585"/>
-                  </a:solidFill>
-                  <a:tailEnd type="triangle" w="lg" len="lg"/>
-                </a:ln>
-                <a:effectLst/>
-              </p:spPr>
-              <p:style>
-                <a:lnRef idx="2">
-                  <a:schemeClr val="accent1"/>
-                </a:lnRef>
-                <a:fillRef idx="0">
-                  <a:schemeClr val="accent1"/>
-                </a:fillRef>
-                <a:effectRef idx="1">
-                  <a:schemeClr val="accent1"/>
-                </a:effectRef>
-                <a:fontRef idx="minor">
-                  <a:schemeClr val="tx1"/>
-                </a:fontRef>
-              </p:style>
-            </p:cxnSp>
-            <p:cxnSp>
-              <p:nvCxnSpPr>
-                <p:cNvPr id="15" name="Straight Arrow Connector 14">
-                  <a:extLst>
-                    <a:ext uri="{FF2B5EF4-FFF2-40B4-BE49-F238E27FC236}">
-                      <a16:creationId xmlns:a16="http://schemas.microsoft.com/office/drawing/2014/main" id="{57EA7DCF-A8A4-05EE-D5AA-AD7E26C94475}"/>
-                    </a:ext>
-                  </a:extLst>
-                </p:cNvPr>
-                <p:cNvCxnSpPr>
-                  <a:cxnSpLocks/>
-                  <a:stCxn id="3" idx="2"/>
-                  <a:endCxn id="11" idx="0"/>
-                </p:cNvCxnSpPr>
-                <p:nvPr/>
-              </p:nvCxnSpPr>
-              <p:spPr>
-                <a:xfrm>
-                  <a:off x="5172749" y="4998960"/>
-                  <a:ext cx="0" cy="676959"/>
-                </a:xfrm>
-                <a:prstGeom prst="straightConnector1">
-                  <a:avLst/>
-                </a:prstGeom>
-                <a:ln w="38100">
-                  <a:solidFill>
-                    <a:srgbClr val="1B8585"/>
-                  </a:solidFill>
-                  <a:tailEnd type="triangle" w="lg" len="lg"/>
-                </a:ln>
-                <a:effectLst/>
-              </p:spPr>
-              <p:style>
-                <a:lnRef idx="2">
-                  <a:schemeClr val="accent1"/>
-                </a:lnRef>
-                <a:fillRef idx="0">
-                  <a:schemeClr val="accent1"/>
-                </a:fillRef>
-                <a:effectRef idx="1">
-                  <a:schemeClr val="accent1"/>
-                </a:effectRef>
-                <a:fontRef idx="minor">
-                  <a:schemeClr val="tx1"/>
-                </a:fontRef>
-              </p:style>
-            </p:cxnSp>
-            <p:cxnSp>
-              <p:nvCxnSpPr>
-                <p:cNvPr id="20" name="Straight Arrow Connector 19">
-                  <a:extLst>
-                    <a:ext uri="{FF2B5EF4-FFF2-40B4-BE49-F238E27FC236}">
-                      <a16:creationId xmlns:a16="http://schemas.microsoft.com/office/drawing/2014/main" id="{BE7E3BB3-090B-14AC-D8ED-CB058F810983}"/>
-                    </a:ext>
-                  </a:extLst>
-                </p:cNvPr>
-                <p:cNvCxnSpPr>
-                  <a:cxnSpLocks/>
-                  <a:stCxn id="2" idx="3"/>
-                  <a:endCxn id="3" idx="1"/>
-                </p:cNvCxnSpPr>
-                <p:nvPr/>
-              </p:nvCxnSpPr>
-              <p:spPr>
-                <a:xfrm>
-                  <a:off x="4399522" y="4892987"/>
-                  <a:ext cx="670281" cy="0"/>
-                </a:xfrm>
-                <a:prstGeom prst="straightConnector1">
-                  <a:avLst/>
-                </a:prstGeom>
-                <a:ln w="38100">
-                  <a:solidFill>
-                    <a:srgbClr val="1B8585"/>
-                  </a:solidFill>
-                  <a:tailEnd type="triangle" w="lg" len="lg"/>
-                </a:ln>
-                <a:effectLst/>
-              </p:spPr>
-              <p:style>
-                <a:lnRef idx="2">
-                  <a:schemeClr val="accent1"/>
-                </a:lnRef>
-                <a:fillRef idx="0">
-                  <a:schemeClr val="accent1"/>
-                </a:fillRef>
-                <a:effectRef idx="1">
-                  <a:schemeClr val="accent1"/>
-                </a:effectRef>
-                <a:fontRef idx="minor">
-                  <a:schemeClr val="tx1"/>
-                </a:fontRef>
-              </p:style>
-            </p:cxnSp>
-            <p:cxnSp>
-              <p:nvCxnSpPr>
-                <p:cNvPr id="23" name="Straight Arrow Connector 22">
-                  <a:extLst>
-                    <a:ext uri="{FF2B5EF4-FFF2-40B4-BE49-F238E27FC236}">
-                      <a16:creationId xmlns:a16="http://schemas.microsoft.com/office/drawing/2014/main" id="{97C8A547-38B5-1895-7344-902C7CD57D89}"/>
-                    </a:ext>
-                  </a:extLst>
-                </p:cNvPr>
-                <p:cNvCxnSpPr>
-                  <a:cxnSpLocks/>
-                  <a:stCxn id="12" idx="3"/>
-                  <a:endCxn id="11" idx="1"/>
-                </p:cNvCxnSpPr>
-                <p:nvPr/>
-              </p:nvCxnSpPr>
-              <p:spPr>
-                <a:xfrm>
-                  <a:off x="4399522" y="5781893"/>
-                  <a:ext cx="670281" cy="0"/>
-                </a:xfrm>
-                <a:prstGeom prst="straightConnector1">
-                  <a:avLst/>
-                </a:prstGeom>
-                <a:ln w="38100">
-                  <a:solidFill>
-                    <a:srgbClr val="1B8585"/>
-                  </a:solidFill>
-                  <a:tailEnd type="triangle" w="lg" len="lg"/>
-                </a:ln>
-                <a:effectLst/>
-              </p:spPr>
-              <p:style>
-                <a:lnRef idx="2">
-                  <a:schemeClr val="accent1"/>
-                </a:lnRef>
-                <a:fillRef idx="0">
-                  <a:schemeClr val="accent1"/>
-                </a:fillRef>
-                <a:effectRef idx="1">
-                  <a:schemeClr val="accent1"/>
-                </a:effectRef>
-                <a:fontRef idx="minor">
-                  <a:schemeClr val="tx1"/>
-                </a:fontRef>
-              </p:style>
-            </p:cxnSp>
-            <p:sp>
-              <p:nvSpPr>
-                <p:cNvPr id="11" name="Rounded Rectangle 10">
-                  <a:extLst>
-                    <a:ext uri="{FF2B5EF4-FFF2-40B4-BE49-F238E27FC236}">
-                      <a16:creationId xmlns:a16="http://schemas.microsoft.com/office/drawing/2014/main" id="{9976356E-8E3E-BEDE-9AD0-6816C5FE8714}"/>
-                    </a:ext>
-                  </a:extLst>
-                </p:cNvPr>
-                <p:cNvSpPr/>
-                <p:nvPr/>
-              </p:nvSpPr>
-              <p:spPr>
-                <a:xfrm>
-                  <a:off x="5069803" y="5675919"/>
-                  <a:ext cx="205892" cy="211947"/>
-                </a:xfrm>
-                <a:prstGeom prst="roundRect">
-                  <a:avLst/>
-                </a:prstGeom>
-                <a:solidFill>
-                  <a:schemeClr val="bg1"/>
-                </a:solidFill>
-                <a:ln w="38100">
-                  <a:solidFill>
-                    <a:srgbClr val="1B8585"/>
-                  </a:solidFill>
-                </a:ln>
-                <a:effectLst/>
-              </p:spPr>
-              <p:style>
-                <a:lnRef idx="1">
-                  <a:schemeClr val="accent1"/>
-                </a:lnRef>
-                <a:fillRef idx="3">
-                  <a:schemeClr val="accent1"/>
-                </a:fillRef>
-                <a:effectRef idx="2">
-                  <a:schemeClr val="accent1"/>
-                </a:effectRef>
-                <a:fontRef idx="minor">
-                  <a:schemeClr val="lt1"/>
-                </a:fontRef>
-              </p:style>
-              <p:txBody>
-                <a:bodyPr rtlCol="0" anchor="ctr"/>
-                <a:lstStyle/>
-                <a:p>
-                  <a:pPr algn="ctr"/>
-                  <a:endParaRPr lang="en-US"/>
-                </a:p>
-              </p:txBody>
-            </p:sp>
-            <p:sp>
-              <p:nvSpPr>
-                <p:cNvPr id="2" name="Rounded Rectangle 1">
-                  <a:extLst>
-                    <a:ext uri="{FF2B5EF4-FFF2-40B4-BE49-F238E27FC236}">
-                      <a16:creationId xmlns:a16="http://schemas.microsoft.com/office/drawing/2014/main" id="{F63A9E00-109C-537F-12B8-2A0E4F3D6D70}"/>
-                    </a:ext>
-                  </a:extLst>
-                </p:cNvPr>
-                <p:cNvSpPr/>
-                <p:nvPr/>
-              </p:nvSpPr>
-              <p:spPr>
-                <a:xfrm>
-                  <a:off x="4193630" y="4787013"/>
-                  <a:ext cx="205892" cy="211947"/>
-                </a:xfrm>
-                <a:prstGeom prst="roundRect">
-                  <a:avLst/>
-                </a:prstGeom>
-                <a:solidFill>
-                  <a:schemeClr val="bg1"/>
-                </a:solidFill>
-                <a:ln w="38100">
-                  <a:solidFill>
-                    <a:srgbClr val="1B8585"/>
-                  </a:solidFill>
-                </a:ln>
-                <a:effectLst/>
-              </p:spPr>
-              <p:style>
-                <a:lnRef idx="1">
-                  <a:schemeClr val="accent1"/>
-                </a:lnRef>
-                <a:fillRef idx="3">
-                  <a:schemeClr val="accent1"/>
-                </a:fillRef>
-                <a:effectRef idx="2">
-                  <a:schemeClr val="accent1"/>
-                </a:effectRef>
-                <a:fontRef idx="minor">
-                  <a:schemeClr val="lt1"/>
-                </a:fontRef>
-              </p:style>
-              <p:txBody>
-                <a:bodyPr rtlCol="0" anchor="ctr"/>
-                <a:lstStyle/>
-                <a:p>
-                  <a:pPr algn="ctr"/>
-                  <a:endParaRPr lang="en-US"/>
-                </a:p>
-              </p:txBody>
-            </p:sp>
-            <p:sp>
-              <p:nvSpPr>
-                <p:cNvPr id="3" name="Rounded Rectangle 2">
-                  <a:extLst>
-                    <a:ext uri="{FF2B5EF4-FFF2-40B4-BE49-F238E27FC236}">
-                      <a16:creationId xmlns:a16="http://schemas.microsoft.com/office/drawing/2014/main" id="{188FF3CE-A0BE-FD9B-C90E-C14D9D9D3FCB}"/>
-                    </a:ext>
-                  </a:extLst>
-                </p:cNvPr>
-                <p:cNvSpPr/>
-                <p:nvPr/>
-              </p:nvSpPr>
-              <p:spPr>
-                <a:xfrm>
-                  <a:off x="5069803" y="4787013"/>
-                  <a:ext cx="205892" cy="211947"/>
-                </a:xfrm>
-                <a:prstGeom prst="roundRect">
-                  <a:avLst/>
-                </a:prstGeom>
-                <a:solidFill>
-                  <a:schemeClr val="bg1"/>
-                </a:solidFill>
-                <a:ln w="38100">
-                  <a:solidFill>
-                    <a:srgbClr val="1B8585"/>
-                  </a:solidFill>
-                </a:ln>
-                <a:effectLst/>
-              </p:spPr>
-              <p:style>
-                <a:lnRef idx="1">
-                  <a:schemeClr val="accent1"/>
-                </a:lnRef>
-                <a:fillRef idx="3">
-                  <a:schemeClr val="accent1"/>
-                </a:fillRef>
-                <a:effectRef idx="2">
-                  <a:schemeClr val="accent1"/>
-                </a:effectRef>
-                <a:fontRef idx="minor">
-                  <a:schemeClr val="lt1"/>
-                </a:fontRef>
-              </p:style>
-              <p:txBody>
-                <a:bodyPr rtlCol="0" anchor="ctr"/>
-                <a:lstStyle/>
-                <a:p>
-                  <a:pPr algn="ctr"/>
-                  <a:endParaRPr lang="en-US"/>
-                </a:p>
-              </p:txBody>
-            </p:sp>
-            <p:sp>
-              <p:nvSpPr>
-                <p:cNvPr id="12" name="Rounded Rectangle 11">
-                  <a:extLst>
-                    <a:ext uri="{FF2B5EF4-FFF2-40B4-BE49-F238E27FC236}">
-                      <a16:creationId xmlns:a16="http://schemas.microsoft.com/office/drawing/2014/main" id="{8366DD14-96D8-957F-78EA-93789C3A4F58}"/>
-                    </a:ext>
-                  </a:extLst>
-                </p:cNvPr>
-                <p:cNvSpPr/>
-                <p:nvPr/>
-              </p:nvSpPr>
-              <p:spPr>
-                <a:xfrm>
-                  <a:off x="4193630" y="5675919"/>
-                  <a:ext cx="205892" cy="211947"/>
-                </a:xfrm>
-                <a:prstGeom prst="roundRect">
-                  <a:avLst/>
-                </a:prstGeom>
-                <a:solidFill>
-                  <a:schemeClr val="bg1"/>
-                </a:solidFill>
-                <a:ln w="38100">
-                  <a:solidFill>
-                    <a:srgbClr val="1B8585"/>
-                  </a:solidFill>
-                </a:ln>
-                <a:effectLst/>
-              </p:spPr>
-              <p:style>
-                <a:lnRef idx="1">
-                  <a:schemeClr val="accent1"/>
-                </a:lnRef>
-                <a:fillRef idx="3">
-                  <a:schemeClr val="accent1"/>
-                </a:fillRef>
-                <a:effectRef idx="2">
-                  <a:schemeClr val="accent1"/>
-                </a:effectRef>
-                <a:fontRef idx="minor">
-                  <a:schemeClr val="lt1"/>
-                </a:fontRef>
-              </p:style>
-              <p:txBody>
-                <a:bodyPr rtlCol="0" anchor="ctr"/>
-                <a:lstStyle/>
-                <a:p>
-                  <a:pPr algn="ctr"/>
-                  <a:endParaRPr lang="en-US"/>
-                </a:p>
-              </p:txBody>
-            </p:sp>
-          </p:grpSp>
-          <p:sp>
-            <p:nvSpPr>
-              <p:cNvPr id="26" name="Arc 25">
-                <a:extLst>
-                  <a:ext uri="{FF2B5EF4-FFF2-40B4-BE49-F238E27FC236}">
-                    <a16:creationId xmlns:a16="http://schemas.microsoft.com/office/drawing/2014/main" id="{DA3A724D-91CF-D56F-535E-8E2F72E1B138}"/>
-                  </a:ext>
-                </a:extLst>
-              </p:cNvPr>
-              <p:cNvSpPr/>
-              <p:nvPr/>
-            </p:nvSpPr>
-            <p:spPr>
-              <a:xfrm>
-                <a:off x="4560222" y="5232062"/>
-                <a:ext cx="361207" cy="474133"/>
-              </a:xfrm>
-              <a:prstGeom prst="arc">
-                <a:avLst>
-                  <a:gd name="adj1" fmla="val 10977255"/>
-                  <a:gd name="adj2" fmla="val 18076033"/>
-                </a:avLst>
-              </a:prstGeom>
-              <a:ln>
-                <a:solidFill>
-                  <a:schemeClr val="accent2"/>
-                </a:solidFill>
-              </a:ln>
-              <a:effectLst/>
-            </p:spPr>
-            <p:style>
-              <a:lnRef idx="2">
-                <a:schemeClr val="accent1"/>
-              </a:lnRef>
-              <a:fillRef idx="0">
-                <a:schemeClr val="accent1"/>
-              </a:fillRef>
-              <a:effectRef idx="1">
-                <a:schemeClr val="accent1"/>
-              </a:effectRef>
-              <a:fontRef idx="minor">
-                <a:schemeClr val="tx1"/>
-              </a:fontRef>
-            </p:style>
-            <p:txBody>
-              <a:bodyPr rtlCol="0" anchor="ctr"/>
-              <a:lstStyle/>
-              <a:p>
-                <a:pPr algn="ctr"/>
-                <a:endParaRPr lang="en-US"/>
-              </a:p>
-            </p:txBody>
-          </p:sp>
-          <p:sp>
-            <p:nvSpPr>
-              <p:cNvPr id="27" name="Arc 26">
-                <a:extLst>
-                  <a:ext uri="{FF2B5EF4-FFF2-40B4-BE49-F238E27FC236}">
-                    <a16:creationId xmlns:a16="http://schemas.microsoft.com/office/drawing/2014/main" id="{E6AD7D19-5C71-5635-A25B-9C44CE112DE7}"/>
-                  </a:ext>
-                </a:extLst>
-              </p:cNvPr>
-              <p:cNvSpPr/>
-              <p:nvPr/>
-            </p:nvSpPr>
-            <p:spPr>
-              <a:xfrm>
-                <a:off x="4555019" y="4993900"/>
-                <a:ext cx="289486" cy="757899"/>
-              </a:xfrm>
-              <a:prstGeom prst="arc">
-                <a:avLst>
-                  <a:gd name="adj1" fmla="val 9439057"/>
-                  <a:gd name="adj2" fmla="val 19303908"/>
-                </a:avLst>
-              </a:prstGeom>
-              <a:ln>
-                <a:solidFill>
-                  <a:schemeClr val="bg1">
-                    <a:lumMod val="50000"/>
-                  </a:schemeClr>
-                </a:solidFill>
-              </a:ln>
-              <a:effectLst/>
-            </p:spPr>
-            <p:style>
-              <a:lnRef idx="2">
-                <a:schemeClr val="accent1"/>
-              </a:lnRef>
-              <a:fillRef idx="0">
-                <a:schemeClr val="accent1"/>
-              </a:fillRef>
-              <a:effectRef idx="1">
-                <a:schemeClr val="accent1"/>
-              </a:effectRef>
-              <a:fontRef idx="minor">
-                <a:schemeClr val="tx1"/>
-              </a:fontRef>
-            </p:style>
-            <p:txBody>
-              <a:bodyPr rtlCol="0" anchor="ctr"/>
-              <a:lstStyle/>
-              <a:p>
-                <a:pPr algn="ctr"/>
-                <a:endParaRPr lang="en-US"/>
-              </a:p>
-            </p:txBody>
-          </p:sp>
-          <p:cxnSp>
-            <p:nvCxnSpPr>
-              <p:cNvPr id="29" name="Straight Connector 28">
-                <a:extLst>
-                  <a:ext uri="{FF2B5EF4-FFF2-40B4-BE49-F238E27FC236}">
-                    <a16:creationId xmlns:a16="http://schemas.microsoft.com/office/drawing/2014/main" id="{79DE65E7-688D-8066-BBF5-15D59759A445}"/>
-                  </a:ext>
-                </a:extLst>
-              </p:cNvPr>
-              <p:cNvCxnSpPr>
-                <a:cxnSpLocks/>
-                <a:endCxn id="26" idx="0"/>
-              </p:cNvCxnSpPr>
-              <p:nvPr/>
-            </p:nvCxnSpPr>
-            <p:spPr>
-              <a:xfrm>
-                <a:off x="4399522" y="5459815"/>
-                <a:ext cx="160839" cy="0"/>
-              </a:xfrm>
-              <a:prstGeom prst="line">
-                <a:avLst/>
-              </a:prstGeom>
-              <a:ln>
-                <a:solidFill>
-                  <a:schemeClr val="bg1">
-                    <a:lumMod val="50000"/>
-                  </a:schemeClr>
-                </a:solidFill>
-              </a:ln>
-              <a:effectLst/>
-            </p:spPr>
-            <p:style>
-              <a:lnRef idx="2">
-                <a:schemeClr val="accent1"/>
-              </a:lnRef>
-              <a:fillRef idx="0">
-                <a:schemeClr val="accent1"/>
-              </a:fillRef>
-              <a:effectRef idx="1">
-                <a:schemeClr val="accent1"/>
-              </a:effectRef>
-              <a:fontRef idx="minor">
-                <a:schemeClr val="tx1"/>
-              </a:fontRef>
-            </p:style>
-          </p:cxnSp>
-          <p:cxnSp>
-            <p:nvCxnSpPr>
-              <p:cNvPr id="31" name="Straight Connector 30">
-                <a:extLst>
-                  <a:ext uri="{FF2B5EF4-FFF2-40B4-BE49-F238E27FC236}">
-                    <a16:creationId xmlns:a16="http://schemas.microsoft.com/office/drawing/2014/main" id="{2FB22C58-32AA-2A50-4D39-2DCFB64E810E}"/>
-                  </a:ext>
-                </a:extLst>
-              </p:cNvPr>
-              <p:cNvCxnSpPr>
-                <a:cxnSpLocks/>
-                <a:stCxn id="26" idx="2"/>
-              </p:cNvCxnSpPr>
-              <p:nvPr/>
-            </p:nvCxnSpPr>
-            <p:spPr>
-              <a:xfrm>
-                <a:off x="4853395" y="5283746"/>
-                <a:ext cx="228873" cy="1465"/>
-              </a:xfrm>
-              <a:prstGeom prst="line">
-                <a:avLst/>
-              </a:prstGeom>
-              <a:ln>
-                <a:solidFill>
-                  <a:schemeClr val="bg1">
-                    <a:lumMod val="50000"/>
-                  </a:schemeClr>
-                </a:solidFill>
-              </a:ln>
-              <a:effectLst/>
-            </p:spPr>
-            <p:style>
-              <a:lnRef idx="2">
-                <a:schemeClr val="accent1"/>
-              </a:lnRef>
-              <a:fillRef idx="0">
-                <a:schemeClr val="accent1"/>
-              </a:fillRef>
-              <a:effectRef idx="1">
-                <a:schemeClr val="accent1"/>
-              </a:effectRef>
-              <a:fontRef idx="minor">
-                <a:schemeClr val="tx1"/>
-              </a:fontRef>
-            </p:style>
-          </p:cxnSp>
-          <p:cxnSp>
-            <p:nvCxnSpPr>
-              <p:cNvPr id="33" name="Straight Connector 32">
-                <a:extLst>
-                  <a:ext uri="{FF2B5EF4-FFF2-40B4-BE49-F238E27FC236}">
-                    <a16:creationId xmlns:a16="http://schemas.microsoft.com/office/drawing/2014/main" id="{7403E19E-4EEC-5BEE-5230-B55542BECE0A}"/>
-                  </a:ext>
-                </a:extLst>
-              </p:cNvPr>
-              <p:cNvCxnSpPr>
-                <a:cxnSpLocks/>
-                <a:stCxn id="26" idx="0"/>
-              </p:cNvCxnSpPr>
-              <p:nvPr/>
-            </p:nvCxnSpPr>
-            <p:spPr>
-              <a:xfrm>
-                <a:off x="4560361" y="5459815"/>
-                <a:ext cx="509442" cy="0"/>
-              </a:xfrm>
-              <a:prstGeom prst="line">
-                <a:avLst/>
-              </a:prstGeom>
-              <a:ln>
-                <a:solidFill>
-                  <a:schemeClr val="bg1">
-                    <a:lumMod val="50000"/>
-                  </a:schemeClr>
-                </a:solidFill>
-                <a:prstDash val="sysDot"/>
-              </a:ln>
-              <a:effectLst/>
-            </p:spPr>
-            <p:style>
-              <a:lnRef idx="2">
-                <a:schemeClr val="accent1"/>
-              </a:lnRef>
-              <a:fillRef idx="0">
-                <a:schemeClr val="accent1"/>
-              </a:fillRef>
-              <a:effectRef idx="1">
-                <a:schemeClr val="accent1"/>
-              </a:effectRef>
-              <a:fontRef idx="minor">
-                <a:schemeClr val="tx1"/>
-              </a:fontRef>
-            </p:style>
-          </p:cxnSp>
-        </p:grpSp>
-      </p:grpSp>
-      <p:grpSp>
-        <p:nvGrpSpPr>
-          <p:cNvPr id="47" name="Group 46">
-            <a:extLst>
-              <a:ext uri="{FF2B5EF4-FFF2-40B4-BE49-F238E27FC236}">
-                <a16:creationId xmlns:a16="http://schemas.microsoft.com/office/drawing/2014/main" id="{47BD8AD9-7916-3C93-C277-8005A1DC1AF4}"/>
-              </a:ext>
-            </a:extLst>
-          </p:cNvPr>
-          <p:cNvGrpSpPr/>
-          <p:nvPr/>
-        </p:nvGrpSpPr>
-        <p:grpSpPr>
-          <a:xfrm>
-            <a:off x="1506296" y="2005813"/>
-            <a:ext cx="4674371" cy="1829588"/>
-            <a:chOff x="1506296" y="2005813"/>
-            <a:chExt cx="4674371" cy="1829588"/>
-          </a:xfrm>
-        </p:grpSpPr>
-        <p:sp>
-          <p:nvSpPr>
-            <p:cNvPr id="46" name="Rectangle 45">
-              <a:extLst>
-                <a:ext uri="{FF2B5EF4-FFF2-40B4-BE49-F238E27FC236}">
-                  <a16:creationId xmlns:a16="http://schemas.microsoft.com/office/drawing/2014/main" id="{9E8194F6-5862-62DF-CBEC-5294BA2CB594}"/>
+                  <a16:creationId xmlns:a16="http://schemas.microsoft.com/office/drawing/2014/main" id="{985BF0FC-D05B-D06C-FC6A-C16F09BA658E}"/>
                 </a:ext>
               </a:extLst>
             </p:cNvPr>
@@ -4217,17 +4987,19 @@
           </p:nvSpPr>
           <p:spPr>
             <a:xfrm>
-              <a:off x="1506296" y="2005813"/>
-              <a:ext cx="4674371" cy="1829588"/>
+              <a:off x="6110450" y="1975027"/>
+              <a:ext cx="675832" cy="675832"/>
             </a:xfrm>
-            <a:prstGeom prst="rect">
+            <a:prstGeom prst="roundRect">
               <a:avLst/>
             </a:prstGeom>
             <a:solidFill>
               <a:schemeClr val="bg1"/>
             </a:solidFill>
-            <a:ln>
-              <a:noFill/>
+            <a:ln w="228600">
+              <a:solidFill>
+                <a:srgbClr val="1B8585"/>
+              </a:solidFill>
             </a:ln>
             <a:effectLst/>
           </p:spPr>
@@ -4254,207 +5026,401 @@
             </a:p>
           </p:txBody>
         </p:sp>
-        <p:grpSp>
-          <p:nvGrpSpPr>
-            <p:cNvPr id="45" name="Group 44">
+        <p:sp>
+          <p:nvSpPr>
+            <p:cNvPr id="6" name="Rounded Rectangle 5">
               <a:extLst>
                 <a:ext uri="{FF2B5EF4-FFF2-40B4-BE49-F238E27FC236}">
-                  <a16:creationId xmlns:a16="http://schemas.microsoft.com/office/drawing/2014/main" id="{61A21CF9-FCEF-D3F9-9228-E8C57431023D}"/>
+                  <a16:creationId xmlns:a16="http://schemas.microsoft.com/office/drawing/2014/main" id="{82E1FC62-5630-0052-0B9D-4418B59E93E1}"/>
                 </a:ext>
               </a:extLst>
             </p:cNvPr>
-            <p:cNvGrpSpPr/>
+            <p:cNvSpPr/>
             <p:nvPr/>
-          </p:nvGrpSpPr>
-          <p:grpSpPr>
+          </p:nvSpPr>
+          <p:spPr>
             <a:xfrm>
-              <a:off x="1506296" y="2005813"/>
-              <a:ext cx="4674371" cy="1829588"/>
-              <a:chOff x="1506296" y="2005813"/>
-              <a:chExt cx="4674371" cy="1829588"/>
+              <a:off x="3315020" y="4784358"/>
+              <a:ext cx="675832" cy="675832"/>
             </a:xfrm>
-          </p:grpSpPr>
-          <p:sp>
-            <p:nvSpPr>
-              <p:cNvPr id="4" name="Rectangle 3"/>
-              <p:cNvSpPr/>
-              <p:nvPr/>
-            </p:nvSpPr>
-            <p:spPr>
-              <a:xfrm>
-                <a:off x="1506296" y="2005813"/>
-                <a:ext cx="4674371" cy="1829588"/>
-              </a:xfrm>
-              <a:prstGeom prst="rect">
-                <a:avLst/>
-              </a:prstGeom>
-              <a:ln w="3175" cmpd="sng">
-                <a:solidFill>
-                  <a:schemeClr val="bg1">
-                    <a:lumMod val="65000"/>
-                  </a:schemeClr>
-                </a:solidFill>
-              </a:ln>
-              <a:effectLst/>
-            </p:spPr>
-            <p:style>
-              <a:lnRef idx="2">
-                <a:schemeClr val="dk1"/>
-              </a:lnRef>
-              <a:fillRef idx="1">
-                <a:schemeClr val="lt1"/>
-              </a:fillRef>
-              <a:effectRef idx="0">
-                <a:schemeClr val="dk1"/>
-              </a:effectRef>
-              <a:fontRef idx="minor">
-                <a:schemeClr val="dk1"/>
-              </a:fontRef>
-            </p:style>
-            <p:txBody>
-              <a:bodyPr rtlCol="0" anchor="ctr"/>
-              <a:lstStyle/>
-              <a:p>
-                <a:pPr algn="ctr"/>
-                <a:endParaRPr lang="en-US" dirty="0"/>
-              </a:p>
-            </p:txBody>
-          </p:sp>
-          <p:sp>
-            <p:nvSpPr>
-              <p:cNvPr id="5" name="Rectangle 4"/>
-              <p:cNvSpPr/>
-              <p:nvPr/>
-            </p:nvSpPr>
-            <p:spPr>
-              <a:xfrm>
-                <a:off x="1506296" y="2192221"/>
-                <a:ext cx="3506489" cy="1200329"/>
-              </a:xfrm>
-              <a:prstGeom prst="rect">
-                <a:avLst/>
-              </a:prstGeom>
-              <a:noFill/>
-            </p:spPr>
-            <p:txBody>
-              <a:bodyPr wrap="none" lIns="91440" tIns="45720" rIns="91440" bIns="45720">
-                <a:spAutoFit/>
-              </a:bodyPr>
-              <a:lstStyle/>
-              <a:p>
-                <a:pPr algn="ctr"/>
-                <a:r>
-                  <a:rPr lang="en-US" sz="7200" b="1" cap="none" spc="0" dirty="0" err="1">
-                    <a:ln w="12700">
-                      <a:solidFill>
-                        <a:srgbClr val="1B8585"/>
-                      </a:solidFill>
-                      <a:prstDash val="solid"/>
-                    </a:ln>
-                    <a:solidFill>
-                      <a:schemeClr val="bg1"/>
-                    </a:solidFill>
-                    <a:effectLst>
-                      <a:outerShdw blurRad="41275" dist="20320" dir="1800000" algn="tl" rotWithShape="0">
-                        <a:srgbClr val="000000">
-                          <a:alpha val="40000"/>
-                        </a:srgbClr>
-                      </a:outerShdw>
-                    </a:effectLst>
-                  </a:rPr>
-                  <a:t>CatlyNet</a:t>
-                </a:r>
-                <a:endParaRPr lang="en-US" sz="7200" b="1" cap="none" spc="0" dirty="0">
-                  <a:ln w="12700">
-                    <a:solidFill>
-                      <a:srgbClr val="1B8585"/>
-                    </a:solidFill>
-                    <a:prstDash val="solid"/>
-                  </a:ln>
-                  <a:solidFill>
-                    <a:schemeClr val="bg1"/>
-                  </a:solidFill>
-                  <a:effectLst>
-                    <a:outerShdw blurRad="41275" dist="20320" dir="1800000" algn="tl" rotWithShape="0">
-                      <a:srgbClr val="000000">
-                        <a:alpha val="40000"/>
-                      </a:srgbClr>
-                    </a:outerShdw>
-                  </a:effectLst>
-                </a:endParaRPr>
-              </a:p>
-            </p:txBody>
-          </p:sp>
-          <p:sp>
-            <p:nvSpPr>
-              <p:cNvPr id="6" name="TextBox 5"/>
-              <p:cNvSpPr txBox="1"/>
-              <p:nvPr/>
-            </p:nvSpPr>
-            <p:spPr>
-              <a:xfrm>
-                <a:off x="1732533" y="3326704"/>
-                <a:ext cx="3161480" cy="369332"/>
-              </a:xfrm>
-              <a:prstGeom prst="rect">
-                <a:avLst/>
-              </a:prstGeom>
-              <a:noFill/>
-            </p:spPr>
-            <p:txBody>
-              <a:bodyPr wrap="none" rtlCol="0">
-                <a:spAutoFit/>
-              </a:bodyPr>
-              <a:lstStyle/>
-              <a:p>
-                <a:r>
-                  <a:rPr lang="en-US" dirty="0">
-                    <a:solidFill>
-                      <a:srgbClr val="4D4D4A"/>
-                    </a:solidFill>
-                    <a:latin typeface="Arial"/>
-                    <a:cs typeface="Arial"/>
-                  </a:rPr>
-                  <a:t>Daniel Huson and Mike Steel</a:t>
-                </a:r>
-              </a:p>
-            </p:txBody>
-          </p:sp>
-          <p:pic>
-            <p:nvPicPr>
-              <p:cNvPr id="44" name="Picture 43">
-                <a:extLst>
-                  <a:ext uri="{FF2B5EF4-FFF2-40B4-BE49-F238E27FC236}">
-                    <a16:creationId xmlns:a16="http://schemas.microsoft.com/office/drawing/2014/main" id="{5E3D3D3C-F913-F4D7-F677-EFE1103A3BF2}"/>
-                  </a:ext>
-                </a:extLst>
-              </p:cNvPr>
-              <p:cNvPicPr>
-                <a:picLocks noChangeAspect="1"/>
-              </p:cNvPicPr>
-              <p:nvPr/>
-            </p:nvPicPr>
-            <p:blipFill>
-              <a:blip r:embed="rId2"/>
-              <a:srcRect/>
-              <a:stretch/>
-            </p:blipFill>
-            <p:spPr>
-              <a:xfrm>
-                <a:off x="4894013" y="2146300"/>
-                <a:ext cx="1270000" cy="1282700"/>
-              </a:xfrm>
-              <a:prstGeom prst="rect">
-                <a:avLst/>
-              </a:prstGeom>
-            </p:spPr>
-          </p:pic>
-        </p:grpSp>
+            <a:prstGeom prst="roundRect">
+              <a:avLst/>
+            </a:prstGeom>
+            <a:solidFill>
+              <a:schemeClr val="bg1"/>
+            </a:solidFill>
+            <a:ln w="228600">
+              <a:solidFill>
+                <a:srgbClr val="1B8585"/>
+              </a:solidFill>
+            </a:ln>
+            <a:effectLst/>
+          </p:spPr>
+          <p:style>
+            <a:lnRef idx="1">
+              <a:schemeClr val="accent1"/>
+            </a:lnRef>
+            <a:fillRef idx="3">
+              <a:schemeClr val="accent1"/>
+            </a:fillRef>
+            <a:effectRef idx="2">
+              <a:schemeClr val="accent1"/>
+            </a:effectRef>
+            <a:fontRef idx="minor">
+              <a:schemeClr val="lt1"/>
+            </a:fontRef>
+          </p:style>
+          <p:txBody>
+            <a:bodyPr rtlCol="0" anchor="ctr"/>
+            <a:lstStyle/>
+            <a:p>
+              <a:pPr algn="ctr"/>
+              <a:endParaRPr lang="en-US"/>
+            </a:p>
+          </p:txBody>
+        </p:sp>
+        <p:sp>
+          <p:nvSpPr>
+            <p:cNvPr id="7" name="Rounded Rectangle 6">
+              <a:extLst>
+                <a:ext uri="{FF2B5EF4-FFF2-40B4-BE49-F238E27FC236}">
+                  <a16:creationId xmlns:a16="http://schemas.microsoft.com/office/drawing/2014/main" id="{DDBED7CD-E2E4-D459-88C1-B291262294B7}"/>
+                </a:ext>
+              </a:extLst>
+            </p:cNvPr>
+            <p:cNvSpPr/>
+            <p:nvPr/>
+          </p:nvSpPr>
+          <p:spPr>
+            <a:xfrm>
+              <a:off x="6110450" y="4784358"/>
+              <a:ext cx="675832" cy="675832"/>
+            </a:xfrm>
+            <a:prstGeom prst="roundRect">
+              <a:avLst/>
+            </a:prstGeom>
+            <a:solidFill>
+              <a:schemeClr val="bg1"/>
+            </a:solidFill>
+            <a:ln w="228600">
+              <a:solidFill>
+                <a:srgbClr val="1B8585"/>
+              </a:solidFill>
+            </a:ln>
+            <a:effectLst/>
+          </p:spPr>
+          <p:style>
+            <a:lnRef idx="1">
+              <a:schemeClr val="accent1"/>
+            </a:lnRef>
+            <a:fillRef idx="3">
+              <a:schemeClr val="accent1"/>
+            </a:fillRef>
+            <a:effectRef idx="2">
+              <a:schemeClr val="accent1"/>
+            </a:effectRef>
+            <a:fontRef idx="minor">
+              <a:schemeClr val="lt1"/>
+            </a:fontRef>
+          </p:style>
+          <p:txBody>
+            <a:bodyPr rtlCol="0" anchor="ctr"/>
+            <a:lstStyle/>
+            <a:p>
+              <a:pPr algn="ctr"/>
+              <a:endParaRPr lang="en-US"/>
+            </a:p>
+          </p:txBody>
+        </p:sp>
+        <p:cxnSp>
+          <p:nvCxnSpPr>
+            <p:cNvPr id="8" name="Straight Arrow Connector 7">
+              <a:extLst>
+                <a:ext uri="{FF2B5EF4-FFF2-40B4-BE49-F238E27FC236}">
+                  <a16:creationId xmlns:a16="http://schemas.microsoft.com/office/drawing/2014/main" id="{780CC874-CFD1-4978-1BB6-9A28E1716391}"/>
+                </a:ext>
+              </a:extLst>
+            </p:cNvPr>
+            <p:cNvCxnSpPr>
+              <a:cxnSpLocks/>
+            </p:cNvCxnSpPr>
+            <p:nvPr/>
+          </p:nvCxnSpPr>
+          <p:spPr>
+            <a:xfrm>
+              <a:off x="3990852" y="2343054"/>
+              <a:ext cx="2119600" cy="0"/>
+            </a:xfrm>
+            <a:prstGeom prst="straightConnector1">
+              <a:avLst/>
+            </a:prstGeom>
+            <a:ln w="228600">
+              <a:solidFill>
+                <a:srgbClr val="1B8585"/>
+              </a:solidFill>
+              <a:tailEnd type="triangle"/>
+            </a:ln>
+            <a:effectLst/>
+          </p:spPr>
+          <p:style>
+            <a:lnRef idx="2">
+              <a:schemeClr val="accent1"/>
+            </a:lnRef>
+            <a:fillRef idx="0">
+              <a:schemeClr val="accent1"/>
+            </a:fillRef>
+            <a:effectRef idx="1">
+              <a:schemeClr val="accent1"/>
+            </a:effectRef>
+            <a:fontRef idx="minor">
+              <a:schemeClr val="tx1"/>
+            </a:fontRef>
+          </p:style>
+        </p:cxnSp>
+        <p:cxnSp>
+          <p:nvCxnSpPr>
+            <p:cNvPr id="9" name="Straight Arrow Connector 8">
+              <a:extLst>
+                <a:ext uri="{FF2B5EF4-FFF2-40B4-BE49-F238E27FC236}">
+                  <a16:creationId xmlns:a16="http://schemas.microsoft.com/office/drawing/2014/main" id="{CE099F47-BFB9-2EDA-4B9E-33415FEA2BF3}"/>
+                </a:ext>
+              </a:extLst>
+            </p:cNvPr>
+            <p:cNvCxnSpPr>
+              <a:cxnSpLocks/>
+            </p:cNvCxnSpPr>
+            <p:nvPr/>
+          </p:nvCxnSpPr>
+          <p:spPr>
+            <a:xfrm>
+              <a:off x="3990852" y="5152385"/>
+              <a:ext cx="2119600" cy="0"/>
+            </a:xfrm>
+            <a:prstGeom prst="straightConnector1">
+              <a:avLst/>
+            </a:prstGeom>
+            <a:ln w="228600">
+              <a:solidFill>
+                <a:srgbClr val="1B8585"/>
+              </a:solidFill>
+              <a:tailEnd type="triangle"/>
+            </a:ln>
+            <a:effectLst/>
+          </p:spPr>
+          <p:style>
+            <a:lnRef idx="2">
+              <a:schemeClr val="accent1"/>
+            </a:lnRef>
+            <a:fillRef idx="0">
+              <a:schemeClr val="accent1"/>
+            </a:fillRef>
+            <a:effectRef idx="1">
+              <a:schemeClr val="accent1"/>
+            </a:effectRef>
+            <a:fontRef idx="minor">
+              <a:schemeClr val="tx1"/>
+            </a:fontRef>
+          </p:style>
+        </p:cxnSp>
+        <p:cxnSp>
+          <p:nvCxnSpPr>
+            <p:cNvPr id="10" name="Straight Arrow Connector 9">
+              <a:extLst>
+                <a:ext uri="{FF2B5EF4-FFF2-40B4-BE49-F238E27FC236}">
+                  <a16:creationId xmlns:a16="http://schemas.microsoft.com/office/drawing/2014/main" id="{906FE1A9-6A8A-FE41-4190-5335A8F7F981}"/>
+                </a:ext>
+              </a:extLst>
+            </p:cNvPr>
+            <p:cNvCxnSpPr>
+              <a:cxnSpLocks/>
+              <a:stCxn id="7" idx="0"/>
+              <a:endCxn id="5" idx="2"/>
+            </p:cNvCxnSpPr>
+            <p:nvPr/>
+          </p:nvCxnSpPr>
+          <p:spPr>
+            <a:xfrm flipV="1">
+              <a:off x="6448367" y="2650859"/>
+              <a:ext cx="0" cy="2133499"/>
+            </a:xfrm>
+            <a:prstGeom prst="straightConnector1">
+              <a:avLst/>
+            </a:prstGeom>
+            <a:ln w="228600">
+              <a:solidFill>
+                <a:srgbClr val="1B8585"/>
+              </a:solidFill>
+              <a:tailEnd type="triangle"/>
+            </a:ln>
+            <a:effectLst/>
+          </p:spPr>
+          <p:style>
+            <a:lnRef idx="2">
+              <a:schemeClr val="accent1"/>
+            </a:lnRef>
+            <a:fillRef idx="0">
+              <a:schemeClr val="accent1"/>
+            </a:fillRef>
+            <a:effectRef idx="1">
+              <a:schemeClr val="accent1"/>
+            </a:effectRef>
+            <a:fontRef idx="minor">
+              <a:schemeClr val="tx1"/>
+            </a:fontRef>
+          </p:style>
+        </p:cxnSp>
+        <p:cxnSp>
+          <p:nvCxnSpPr>
+            <p:cNvPr id="11" name="Straight Arrow Connector 10">
+              <a:extLst>
+                <a:ext uri="{FF2B5EF4-FFF2-40B4-BE49-F238E27FC236}">
+                  <a16:creationId xmlns:a16="http://schemas.microsoft.com/office/drawing/2014/main" id="{6666D326-323D-19F8-73FE-30CA8FA8EAB4}"/>
+                </a:ext>
+              </a:extLst>
+            </p:cNvPr>
+            <p:cNvCxnSpPr>
+              <a:cxnSpLocks/>
+              <a:stCxn id="6" idx="0"/>
+              <a:endCxn id="4" idx="2"/>
+            </p:cNvCxnSpPr>
+            <p:nvPr/>
+          </p:nvCxnSpPr>
+          <p:spPr>
+            <a:xfrm flipV="1">
+              <a:off x="3652935" y="2650859"/>
+              <a:ext cx="0" cy="2133499"/>
+            </a:xfrm>
+            <a:prstGeom prst="straightConnector1">
+              <a:avLst/>
+            </a:prstGeom>
+            <a:ln w="228600">
+              <a:solidFill>
+                <a:srgbClr val="1B8585"/>
+              </a:solidFill>
+              <a:tailEnd type="triangle"/>
+            </a:ln>
+            <a:effectLst/>
+          </p:spPr>
+          <p:style>
+            <a:lnRef idx="2">
+              <a:schemeClr val="accent1"/>
+            </a:lnRef>
+            <a:fillRef idx="0">
+              <a:schemeClr val="accent1"/>
+            </a:fillRef>
+            <a:effectRef idx="1">
+              <a:schemeClr val="accent1"/>
+            </a:effectRef>
+            <a:fontRef idx="minor">
+              <a:schemeClr val="tx1"/>
+            </a:fontRef>
+          </p:style>
+        </p:cxnSp>
       </p:grpSp>
     </p:spTree>
     <p:extLst>
       <p:ext uri="{BB962C8B-B14F-4D97-AF65-F5344CB8AC3E}">
-        <p14:creationId xmlns:p14="http://schemas.microsoft.com/office/powerpoint/2010/main" val="972316659"/>
+        <p14:creationId xmlns:p14="http://schemas.microsoft.com/office/powerpoint/2010/main" val="4104985478"/>
+      </p:ext>
+    </p:extLst>
+  </p:cSld>
+  <p:clrMapOvr>
+    <a:masterClrMapping/>
+  </p:clrMapOvr>
+</p:sld>
+</file>
+
+<file path=ppt/slides/slide4.xml><?xml version="1.0" encoding="utf-8"?>
+<p:sld xmlns:a="http://schemas.openxmlformats.org/drawingml/2006/main" xmlns:r="http://schemas.openxmlformats.org/officeDocument/2006/relationships" xmlns:p="http://schemas.openxmlformats.org/presentationml/2006/main">
+  <p:cSld>
+    <p:spTree>
+      <p:nvGrpSpPr>
+        <p:cNvPr id="1" name=""/>
+        <p:cNvGrpSpPr/>
+        <p:nvPr/>
+      </p:nvGrpSpPr>
+      <p:grpSpPr>
+        <a:xfrm>
+          <a:off x="0" y="0"/>
+          <a:ext cx="0" cy="0"/>
+          <a:chOff x="0" y="0"/>
+          <a:chExt cx="0" cy="0"/>
+        </a:xfrm>
+      </p:grpSpPr>
+      <p:pic>
+        <p:nvPicPr>
+          <p:cNvPr id="3" name="Picture 2" descr="BioRAF icon">
+            <a:extLst>
+              <a:ext uri="{FF2B5EF4-FFF2-40B4-BE49-F238E27FC236}">
+                <a16:creationId xmlns:a16="http://schemas.microsoft.com/office/drawing/2014/main" id="{0B4D1C32-8D4D-2A93-5D1E-37BC0933985E}"/>
+              </a:ext>
+            </a:extLst>
+          </p:cNvPr>
+          <p:cNvPicPr>
+            <a:picLocks noChangeAspect="1"/>
+          </p:cNvPicPr>
+          <p:nvPr/>
+        </p:nvPicPr>
+        <p:blipFill>
+          <a:blip r:embed="rId2">
+            <a:extLst>
+              <a:ext uri="{BEBA8EAE-BF5A-486C-A8C5-ECC9F3942E4B}">
+                <a14:imgProps xmlns:a14="http://schemas.microsoft.com/office/drawing/2010/main">
+                  <a14:imgLayer r:embed="rId3">
+                    <a14:imgEffect>
+                      <a14:backgroundRemoval t="7101" b="90861" l="7779" r="91430">
+                        <a14:foregroundMark x1="10415" y1="8941" x2="22149" y2="9796"/>
+                        <a14:foregroundMark x1="22149" y1="9796" x2="25181" y2="23669"/>
+                        <a14:foregroundMark x1="6987" y1="11111" x2="8701" y2="22485"/>
+                        <a14:foregroundMark x1="8701" y1="22485" x2="9163" y2="23471"/>
+                        <a14:foregroundMark x1="8042" y1="25378" x2="19776" y2="24852"/>
+                        <a14:foregroundMark x1="19776" y1="24852" x2="21094" y2="24326"/>
+                        <a14:foregroundMark x1="8701" y1="7692" x2="20237" y2="7692"/>
+                        <a14:foregroundMark x1="20237" y1="7692" x2="25840" y2="15319"/>
+                        <a14:foregroundMark x1="27093" y1="16634" x2="39288" y2="16700"/>
+                        <a14:foregroundMark x1="39288" y1="16700" x2="51088" y2="16371"/>
+                        <a14:foregroundMark x1="51088" y1="16371" x2="69875" y2="16831"/>
+                        <a14:foregroundMark x1="60053" y1="11308" x2="67765" y2="16174"/>
+                        <a14:foregroundMark x1="60712" y1="23866" x2="70732" y2="18146"/>
+                        <a14:foregroundMark x1="70732" y1="18146" x2="71786" y2="17028"/>
+                        <a14:foregroundMark x1="71786" y1="17028" x2="83388" y2="17028"/>
+                        <a14:foregroundMark x1="83388" y1="17028" x2="90442" y2="16437"/>
+                        <a14:foregroundMark x1="74621" y1="11506" x2="78906" y2="22288"/>
+                        <a14:foregroundMark x1="78906" y1="22288" x2="90310" y2="22814"/>
+                        <a14:foregroundMark x1="90310" y1="22814" x2="91167" y2="10059"/>
+                        <a14:foregroundMark x1="91167" y1="10059" x2="79499" y2="7232"/>
+                        <a14:foregroundMark x1="79499" y1="7232" x2="75016" y2="10256"/>
+                        <a14:foregroundMark x1="91299" y1="10848" x2="91496" y2="22880"/>
+                        <a14:foregroundMark x1="91496" y1="22880" x2="79960" y2="24063"/>
+                        <a14:foregroundMark x1="79960" y1="24063" x2="76730" y2="19592"/>
+                        <a14:foregroundMark x1="82531" y1="28797" x2="84443" y2="90861"/>
+                        <a14:foregroundMark x1="8306" y1="75937" x2="8899" y2="87442"/>
+                        <a14:foregroundMark x1="8899" y1="87442" x2="23467" y2="90598"/>
+                      </a14:backgroundRemoval>
+                    </a14:imgEffect>
+                  </a14:imgLayer>
+                </a14:imgProps>
+              </a:ext>
+            </a:extLst>
+          </a:blip>
+          <a:stretch>
+            <a:fillRect/>
+          </a:stretch>
+        </p:blipFill>
+        <p:spPr>
+          <a:xfrm>
+            <a:off x="2476500" y="1327150"/>
+            <a:ext cx="4191000" cy="4203700"/>
+          </a:xfrm>
+          <a:prstGeom prst="rect">
+            <a:avLst/>
+          </a:prstGeom>
+        </p:spPr>
+      </p:pic>
+    </p:spTree>
+    <p:extLst>
+      <p:ext uri="{BB962C8B-B14F-4D97-AF65-F5344CB8AC3E}">
+        <p14:creationId xmlns:p14="http://schemas.microsoft.com/office/powerpoint/2010/main" val="603379455"/>
       </p:ext>
     </p:extLst>
   </p:cSld>
@@ -4782,4 +5748,299 @@
   </a:objectDefaults>
   <a:extraClrSchemeLst/>
 </a:theme>
+</file>
+
+<file path=ppt/theme/theme2.xml><?xml version="1.0" encoding="utf-8"?>
+<a:theme xmlns:a="http://schemas.openxmlformats.org/drawingml/2006/main" name="Office Theme">
+  <a:themeElements>
+    <a:clrScheme name="Office">
+      <a:dk1>
+        <a:sysClr val="windowText" lastClr="000000"/>
+      </a:dk1>
+      <a:lt1>
+        <a:sysClr val="window" lastClr="FFFFFF"/>
+      </a:lt1>
+      <a:dk2>
+        <a:srgbClr val="44546A"/>
+      </a:dk2>
+      <a:lt2>
+        <a:srgbClr val="E7E6E6"/>
+      </a:lt2>
+      <a:accent1>
+        <a:srgbClr val="4472C4"/>
+      </a:accent1>
+      <a:accent2>
+        <a:srgbClr val="ED7D31"/>
+      </a:accent2>
+      <a:accent3>
+        <a:srgbClr val="A5A5A5"/>
+      </a:accent3>
+      <a:accent4>
+        <a:srgbClr val="FFC000"/>
+      </a:accent4>
+      <a:accent5>
+        <a:srgbClr val="5B9BD5"/>
+      </a:accent5>
+      <a:accent6>
+        <a:srgbClr val="70AD47"/>
+      </a:accent6>
+      <a:hlink>
+        <a:srgbClr val="0563C1"/>
+      </a:hlink>
+      <a:folHlink>
+        <a:srgbClr val="954F72"/>
+      </a:folHlink>
+    </a:clrScheme>
+    <a:fontScheme name="Office">
+      <a:majorFont>
+        <a:latin typeface="Calibri Light" panose="020F0302020204030204"/>
+        <a:ea typeface=""/>
+        <a:cs typeface=""/>
+        <a:font script="Jpan" typeface="游ゴシック Light"/>
+        <a:font script="Hang" typeface="맑은 고딕"/>
+        <a:font script="Hans" typeface="等线 Light"/>
+        <a:font script="Hant" typeface="新細明體"/>
+        <a:font script="Arab" typeface="Times New Roman"/>
+        <a:font script="Hebr" typeface="Times New Roman"/>
+        <a:font script="Thai" typeface="Angsana New"/>
+        <a:font script="Ethi" typeface="Nyala"/>
+        <a:font script="Beng" typeface="Vrinda"/>
+        <a:font script="Gujr" typeface="Shruti"/>
+        <a:font script="Khmr" typeface="MoolBoran"/>
+        <a:font script="Knda" typeface="Tunga"/>
+        <a:font script="Guru" typeface="Raavi"/>
+        <a:font script="Cans" typeface="Euphemia"/>
+        <a:font script="Cher" typeface="Plantagenet Cherokee"/>
+        <a:font script="Yiii" typeface="Microsoft Yi Baiti"/>
+        <a:font script="Tibt" typeface="Microsoft Himalaya"/>
+        <a:font script="Thaa" typeface="MV Boli"/>
+        <a:font script="Deva" typeface="Mangal"/>
+        <a:font script="Telu" typeface="Gautami"/>
+        <a:font script="Taml" typeface="Latha"/>
+        <a:font script="Syrc" typeface="Estrangelo Edessa"/>
+        <a:font script="Orya" typeface="Kalinga"/>
+        <a:font script="Mlym" typeface="Kartika"/>
+        <a:font script="Laoo" typeface="DokChampa"/>
+        <a:font script="Sinh" typeface="Iskoola Pota"/>
+        <a:font script="Mong" typeface="Mongolian Baiti"/>
+        <a:font script="Viet" typeface="Times New Roman"/>
+        <a:font script="Uigh" typeface="Microsoft Uighur"/>
+        <a:font script="Geor" typeface="Sylfaen"/>
+        <a:font script="Armn" typeface="Arial"/>
+        <a:font script="Bugi" typeface="Leelawadee UI"/>
+        <a:font script="Bopo" typeface="Microsoft JhengHei"/>
+        <a:font script="Java" typeface="Javanese Text"/>
+        <a:font script="Lisu" typeface="Segoe UI"/>
+        <a:font script="Mymr" typeface="Myanmar Text"/>
+        <a:font script="Nkoo" typeface="Ebrima"/>
+        <a:font script="Olck" typeface="Nirmala UI"/>
+        <a:font script="Osma" typeface="Ebrima"/>
+        <a:font script="Phag" typeface="Phagspa"/>
+        <a:font script="Syrn" typeface="Estrangelo Edessa"/>
+        <a:font script="Syrj" typeface="Estrangelo Edessa"/>
+        <a:font script="Syre" typeface="Estrangelo Edessa"/>
+        <a:font script="Sora" typeface="Nirmala UI"/>
+        <a:font script="Tale" typeface="Microsoft Tai Le"/>
+        <a:font script="Talu" typeface="Microsoft New Tai Lue"/>
+        <a:font script="Tfng" typeface="Ebrima"/>
+      </a:majorFont>
+      <a:minorFont>
+        <a:latin typeface="Calibri" panose="020F0502020204030204"/>
+        <a:ea typeface=""/>
+        <a:cs typeface=""/>
+        <a:font script="Jpan" typeface="游ゴシック"/>
+        <a:font script="Hang" typeface="맑은 고딕"/>
+        <a:font script="Hans" typeface="等线"/>
+        <a:font script="Hant" typeface="新細明體"/>
+        <a:font script="Arab" typeface="Arial"/>
+        <a:font script="Hebr" typeface="Arial"/>
+        <a:font script="Thai" typeface="Cordia New"/>
+        <a:font script="Ethi" typeface="Nyala"/>
+        <a:font script="Beng" typeface="Vrinda"/>
+        <a:font script="Gujr" typeface="Shruti"/>
+        <a:font script="Khmr" typeface="DaunPenh"/>
+        <a:font script="Knda" typeface="Tunga"/>
+        <a:font script="Guru" typeface="Raavi"/>
+        <a:font script="Cans" typeface="Euphemia"/>
+        <a:font script="Cher" typeface="Plantagenet Cherokee"/>
+        <a:font script="Yiii" typeface="Microsoft Yi Baiti"/>
+        <a:font script="Tibt" typeface="Microsoft Himalaya"/>
+        <a:font script="Thaa" typeface="MV Boli"/>
+        <a:font script="Deva" typeface="Mangal"/>
+        <a:font script="Telu" typeface="Gautami"/>
+        <a:font script="Taml" typeface="Latha"/>
+        <a:font script="Syrc" typeface="Estrangelo Edessa"/>
+        <a:font script="Orya" typeface="Kalinga"/>
+        <a:font script="Mlym" typeface="Kartika"/>
+        <a:font script="Laoo" typeface="DokChampa"/>
+        <a:font script="Sinh" typeface="Iskoola Pota"/>
+        <a:font script="Mong" typeface="Mongolian Baiti"/>
+        <a:font script="Viet" typeface="Arial"/>
+        <a:font script="Uigh" typeface="Microsoft Uighur"/>
+        <a:font script="Geor" typeface="Sylfaen"/>
+        <a:font script="Armn" typeface="Arial"/>
+        <a:font script="Bugi" typeface="Leelawadee UI"/>
+        <a:font script="Bopo" typeface="Microsoft JhengHei"/>
+        <a:font script="Java" typeface="Javanese Text"/>
+        <a:font script="Lisu" typeface="Segoe UI"/>
+        <a:font script="Mymr" typeface="Myanmar Text"/>
+        <a:font script="Nkoo" typeface="Ebrima"/>
+        <a:font script="Olck" typeface="Nirmala UI"/>
+        <a:font script="Osma" typeface="Ebrima"/>
+        <a:font script="Phag" typeface="Phagspa"/>
+        <a:font script="Syrn" typeface="Estrangelo Edessa"/>
+        <a:font script="Syrj" typeface="Estrangelo Edessa"/>
+        <a:font script="Syre" typeface="Estrangelo Edessa"/>
+        <a:font script="Sora" typeface="Nirmala UI"/>
+        <a:font script="Tale" typeface="Microsoft Tai Le"/>
+        <a:font script="Talu" typeface="Microsoft New Tai Lue"/>
+        <a:font script="Tfng" typeface="Ebrima"/>
+      </a:minorFont>
+    </a:fontScheme>
+    <a:fmtScheme name="Office">
+      <a:fillStyleLst>
+        <a:solidFill>
+          <a:schemeClr val="phClr"/>
+        </a:solidFill>
+        <a:gradFill rotWithShape="1">
+          <a:gsLst>
+            <a:gs pos="0">
+              <a:schemeClr val="phClr">
+                <a:lumMod val="110000"/>
+                <a:satMod val="105000"/>
+                <a:tint val="67000"/>
+              </a:schemeClr>
+            </a:gs>
+            <a:gs pos="50000">
+              <a:schemeClr val="phClr">
+                <a:lumMod val="105000"/>
+                <a:satMod val="103000"/>
+                <a:tint val="73000"/>
+              </a:schemeClr>
+            </a:gs>
+            <a:gs pos="100000">
+              <a:schemeClr val="phClr">
+                <a:lumMod val="105000"/>
+                <a:satMod val="109000"/>
+                <a:tint val="81000"/>
+              </a:schemeClr>
+            </a:gs>
+          </a:gsLst>
+          <a:lin ang="5400000" scaled="0"/>
+        </a:gradFill>
+        <a:gradFill rotWithShape="1">
+          <a:gsLst>
+            <a:gs pos="0">
+              <a:schemeClr val="phClr">
+                <a:satMod val="103000"/>
+                <a:lumMod val="102000"/>
+                <a:tint val="94000"/>
+              </a:schemeClr>
+            </a:gs>
+            <a:gs pos="50000">
+              <a:schemeClr val="phClr">
+                <a:satMod val="110000"/>
+                <a:lumMod val="100000"/>
+                <a:shade val="100000"/>
+              </a:schemeClr>
+            </a:gs>
+            <a:gs pos="100000">
+              <a:schemeClr val="phClr">
+                <a:lumMod val="99000"/>
+                <a:satMod val="120000"/>
+                <a:shade val="78000"/>
+              </a:schemeClr>
+            </a:gs>
+          </a:gsLst>
+          <a:lin ang="5400000" scaled="0"/>
+        </a:gradFill>
+      </a:fillStyleLst>
+      <a:lnStyleLst>
+        <a:ln w="6350" cap="flat" cmpd="sng" algn="ctr">
+          <a:solidFill>
+            <a:schemeClr val="phClr"/>
+          </a:solidFill>
+          <a:prstDash val="solid"/>
+          <a:miter lim="800000"/>
+        </a:ln>
+        <a:ln w="12700" cap="flat" cmpd="sng" algn="ctr">
+          <a:solidFill>
+            <a:schemeClr val="phClr"/>
+          </a:solidFill>
+          <a:prstDash val="solid"/>
+          <a:miter lim="800000"/>
+        </a:ln>
+        <a:ln w="19050" cap="flat" cmpd="sng" algn="ctr">
+          <a:solidFill>
+            <a:schemeClr val="phClr"/>
+          </a:solidFill>
+          <a:prstDash val="solid"/>
+          <a:miter lim="800000"/>
+        </a:ln>
+      </a:lnStyleLst>
+      <a:effectStyleLst>
+        <a:effectStyle>
+          <a:effectLst/>
+        </a:effectStyle>
+        <a:effectStyle>
+          <a:effectLst/>
+        </a:effectStyle>
+        <a:effectStyle>
+          <a:effectLst>
+            <a:outerShdw blurRad="57150" dist="19050" dir="5400000" algn="ctr" rotWithShape="0">
+              <a:srgbClr val="000000">
+                <a:alpha val="63000"/>
+              </a:srgbClr>
+            </a:outerShdw>
+          </a:effectLst>
+        </a:effectStyle>
+      </a:effectStyleLst>
+      <a:bgFillStyleLst>
+        <a:solidFill>
+          <a:schemeClr val="phClr"/>
+        </a:solidFill>
+        <a:solidFill>
+          <a:schemeClr val="phClr">
+            <a:tint val="95000"/>
+            <a:satMod val="170000"/>
+          </a:schemeClr>
+        </a:solidFill>
+        <a:gradFill rotWithShape="1">
+          <a:gsLst>
+            <a:gs pos="0">
+              <a:schemeClr val="phClr">
+                <a:tint val="93000"/>
+                <a:satMod val="150000"/>
+                <a:shade val="98000"/>
+                <a:lumMod val="102000"/>
+              </a:schemeClr>
+            </a:gs>
+            <a:gs pos="50000">
+              <a:schemeClr val="phClr">
+                <a:tint val="98000"/>
+                <a:satMod val="130000"/>
+                <a:shade val="90000"/>
+                <a:lumMod val="103000"/>
+              </a:schemeClr>
+            </a:gs>
+            <a:gs pos="100000">
+              <a:schemeClr val="phClr">
+                <a:shade val="63000"/>
+                <a:satMod val="120000"/>
+              </a:schemeClr>
+            </a:gs>
+          </a:gsLst>
+          <a:lin ang="5400000" scaled="0"/>
+        </a:gradFill>
+      </a:bgFillStyleLst>
+    </a:fmtScheme>
+  </a:themeElements>
+  <a:objectDefaults/>
+  <a:extraClrSchemeLst/>
+  <a:extLst>
+    <a:ext uri="{05A4C25C-085E-4340-85A3-A5531E510DB2}">
+      <thm15:themeFamily xmlns:thm15="http://schemas.microsoft.com/office/thememl/2012/main" name="Office Theme" id="{62F939B6-93AF-4DB8-9C6B-D6C7DFDC589F}" vid="{4A3C46E8-61CC-4603-A589-7422A47A8E4A}"/>
+    </a:ext>
+  </a:extLst>
+</a:theme>
 </file>
</xml_diff>